<commit_message>
Updated use cases and draft of report file
With UML diagrams
</commit_message>
<xml_diff>
--- a/Module 4 Deliverables/State Transition Diagrams/CS_633_Zac3_term_project_report_module4.pptx
+++ b/Module 4 Deliverables/State Transition Diagrams/CS_633_Zac3_term_project_report_module4.pptx
@@ -127,7 +127,7 @@
   </p:defaultTextStyle>
   <p:extLst>
     <p:ext uri="{EFAFB233-063F-42B5-8137-9DF3F51BA10A}">
-      <p15:sldGuideLst xmlns="" xmlns:p15="http://schemas.microsoft.com/office/powerpoint/2012/main">
+      <p15:sldGuideLst xmlns:p15="http://schemas.microsoft.com/office/powerpoint/2012/main" xmlns="">
         <p15:guide id="1" orient="horz" pos="1620">
           <p15:clr>
             <a:srgbClr val="A4A3A4"/>
@@ -226,7 +226,7 @@
           <a:p>
             <a:fld id="{9B8A9A2D-E852-3844-9DB4-1B4DAD75F3D7}" type="datetimeFigureOut">
               <a:rPr lang="en-US" smtClean="0"/>
-              <a:t>2018-02-12</a:t>
+              <a:t>2018-02-13</a:t>
             </a:fld>
             <a:endParaRPr lang="en-US"/>
           </a:p>
@@ -984,7 +984,7 @@
           <a:p>
             <a:fld id="{CBBBF805-5D4B-8F4E-93F2-E4965DAE73BF}" type="datetimeFigureOut">
               <a:rPr lang="en-US" smtClean="0"/>
-              <a:t>2018-02-12</a:t>
+              <a:t>2018-02-13</a:t>
             </a:fld>
             <a:endParaRPr lang="en-US"/>
           </a:p>
@@ -1174,7 +1174,7 @@
           <a:p>
             <a:fld id="{CBBBF805-5D4B-8F4E-93F2-E4965DAE73BF}" type="datetimeFigureOut">
               <a:rPr lang="en-US" smtClean="0"/>
-              <a:t>2018-02-12</a:t>
+              <a:t>2018-02-13</a:t>
             </a:fld>
             <a:endParaRPr lang="en-US"/>
           </a:p>
@@ -1358,7 +1358,7 @@
           <a:p>
             <a:fld id="{CBBBF805-5D4B-8F4E-93F2-E4965DAE73BF}" type="datetimeFigureOut">
               <a:rPr lang="en-US" smtClean="0"/>
-              <a:t>2018-02-12</a:t>
+              <a:t>2018-02-13</a:t>
             </a:fld>
             <a:endParaRPr lang="en-US"/>
           </a:p>
@@ -1620,7 +1620,7 @@
           <a:p>
             <a:fld id="{CBBBF805-5D4B-8F4E-93F2-E4965DAE73BF}" type="datetimeFigureOut">
               <a:rPr lang="en-US" smtClean="0"/>
-              <a:t>2018-02-12</a:t>
+              <a:t>2018-02-13</a:t>
             </a:fld>
             <a:endParaRPr lang="en-US"/>
           </a:p>
@@ -2068,7 +2068,7 @@
           <a:p>
             <a:fld id="{CBBBF805-5D4B-8F4E-93F2-E4965DAE73BF}" type="datetimeFigureOut">
               <a:rPr lang="en-US" smtClean="0"/>
-              <a:t>2018-02-12</a:t>
+              <a:t>2018-02-13</a:t>
             </a:fld>
             <a:endParaRPr lang="en-US"/>
           </a:p>
@@ -2339,7 +2339,7 @@
           <a:p>
             <a:fld id="{CBBBF805-5D4B-8F4E-93F2-E4965DAE73BF}" type="datetimeFigureOut">
               <a:rPr lang="en-US" smtClean="0"/>
-              <a:t>2018-02-12</a:t>
+              <a:t>2018-02-13</a:t>
             </a:fld>
             <a:endParaRPr lang="en-US"/>
           </a:p>
@@ -2574,7 +2574,7 @@
           <a:p>
             <a:fld id="{CBBBF805-5D4B-8F4E-93F2-E4965DAE73BF}" type="datetimeFigureOut">
               <a:rPr lang="en-US" smtClean="0"/>
-              <a:t>2018-02-12</a:t>
+              <a:t>2018-02-13</a:t>
             </a:fld>
             <a:endParaRPr lang="en-US"/>
           </a:p>
@@ -2768,7 +2768,7 @@
           <a:p>
             <a:fld id="{CBBBF805-5D4B-8F4E-93F2-E4965DAE73BF}" type="datetimeFigureOut">
               <a:rPr lang="en-US" smtClean="0"/>
-              <a:t>2018-02-12</a:t>
+              <a:t>2018-02-13</a:t>
             </a:fld>
             <a:endParaRPr lang="en-US"/>
           </a:p>
@@ -2866,7 +2866,7 @@
           <a:p>
             <a:fld id="{CBBBF805-5D4B-8F4E-93F2-E4965DAE73BF}" type="datetimeFigureOut">
               <a:rPr lang="en-US" smtClean="0"/>
-              <a:t>2018-02-12</a:t>
+              <a:t>2018-02-13</a:t>
             </a:fld>
             <a:endParaRPr lang="en-US"/>
           </a:p>
@@ -3031,7 +3031,7 @@
           <a:p>
             <a:fld id="{CBBBF805-5D4B-8F4E-93F2-E4965DAE73BF}" type="datetimeFigureOut">
               <a:rPr lang="en-US" smtClean="0"/>
-              <a:t>2018-02-12</a:t>
+              <a:t>2018-02-13</a:t>
             </a:fld>
             <a:endParaRPr lang="en-US"/>
           </a:p>
@@ -3548,7 +3548,7 @@
           <a:p>
             <a:fld id="{CBBBF805-5D4B-8F4E-93F2-E4965DAE73BF}" type="datetimeFigureOut">
               <a:rPr lang="en-US" smtClean="0"/>
-              <a:t>2018-02-12</a:t>
+              <a:t>2018-02-13</a:t>
             </a:fld>
             <a:endParaRPr lang="en-US"/>
           </a:p>
@@ -3807,7 +3807,7 @@
           <a:p>
             <a:fld id="{CBBBF805-5D4B-8F4E-93F2-E4965DAE73BF}" type="datetimeFigureOut">
               <a:rPr lang="en-US" smtClean="0"/>
-              <a:t>2018-02-12</a:t>
+              <a:t>2018-02-13</a:t>
             </a:fld>
             <a:endParaRPr lang="en-US"/>
           </a:p>
@@ -4877,42 +4877,42 @@
                 <a:gridCol w="599799">
                   <a:extLst>
                     <a:ext uri="{9D8B030D-6E8A-4147-A177-3AD203B41FA5}">
-                      <a16:colId xmlns="" xmlns:a16="http://schemas.microsoft.com/office/drawing/2014/main" val="20000"/>
+                      <a16:colId xmlns:a16="http://schemas.microsoft.com/office/drawing/2014/main" xmlns="" val="20000"/>
                     </a:ext>
                   </a:extLst>
                 </a:gridCol>
                 <a:gridCol w="2574235">
                   <a:extLst>
                     <a:ext uri="{9D8B030D-6E8A-4147-A177-3AD203B41FA5}">
-                      <a16:colId xmlns="" xmlns:a16="http://schemas.microsoft.com/office/drawing/2014/main" val="20001"/>
+                      <a16:colId xmlns:a16="http://schemas.microsoft.com/office/drawing/2014/main" xmlns="" val="20001"/>
                     </a:ext>
                   </a:extLst>
                 </a:gridCol>
                 <a:gridCol w="881007">
                   <a:extLst>
                     <a:ext uri="{9D8B030D-6E8A-4147-A177-3AD203B41FA5}">
-                      <a16:colId xmlns="" xmlns:a16="http://schemas.microsoft.com/office/drawing/2014/main" val="20002"/>
+                      <a16:colId xmlns:a16="http://schemas.microsoft.com/office/drawing/2014/main" xmlns="" val="20002"/>
                     </a:ext>
                   </a:extLst>
                 </a:gridCol>
                 <a:gridCol w="1029665">
                   <a:extLst>
                     <a:ext uri="{9D8B030D-6E8A-4147-A177-3AD203B41FA5}">
-                      <a16:colId xmlns="" xmlns:a16="http://schemas.microsoft.com/office/drawing/2014/main" val="20003"/>
+                      <a16:colId xmlns:a16="http://schemas.microsoft.com/office/drawing/2014/main" xmlns="" val="20003"/>
                     </a:ext>
                   </a:extLst>
                 </a:gridCol>
                 <a:gridCol w="1709794">
                   <a:extLst>
                     <a:ext uri="{9D8B030D-6E8A-4147-A177-3AD203B41FA5}">
-                      <a16:colId xmlns="" xmlns:a16="http://schemas.microsoft.com/office/drawing/2014/main" val="20004"/>
+                      <a16:colId xmlns:a16="http://schemas.microsoft.com/office/drawing/2014/main" xmlns="" val="20004"/>
                     </a:ext>
                   </a:extLst>
                 </a:gridCol>
                 <a:gridCol w="1358900">
                   <a:extLst>
                     <a:ext uri="{9D8B030D-6E8A-4147-A177-3AD203B41FA5}">
-                      <a16:colId xmlns="" xmlns:a16="http://schemas.microsoft.com/office/drawing/2014/main" val="20005"/>
+                      <a16:colId xmlns:a16="http://schemas.microsoft.com/office/drawing/2014/main" xmlns="" val="20005"/>
                     </a:ext>
                   </a:extLst>
                 </a:gridCol>
@@ -5101,7 +5101,7 @@
                 </a:tc>
                 <a:extLst>
                   <a:ext uri="{0D108BD9-81ED-4DB2-BD59-A6C34878D82A}">
-                    <a16:rowId xmlns="" xmlns:a16="http://schemas.microsoft.com/office/drawing/2014/main" val="10000"/>
+                    <a16:rowId xmlns:a16="http://schemas.microsoft.com/office/drawing/2014/main" xmlns="" val="10000"/>
                   </a:ext>
                 </a:extLst>
               </a:tr>
@@ -5307,7 +5307,7 @@
                 </a:tc>
                 <a:extLst>
                   <a:ext uri="{0D108BD9-81ED-4DB2-BD59-A6C34878D82A}">
-                    <a16:rowId xmlns="" xmlns:a16="http://schemas.microsoft.com/office/drawing/2014/main" val="10001"/>
+                    <a16:rowId xmlns:a16="http://schemas.microsoft.com/office/drawing/2014/main" xmlns="" val="10001"/>
                   </a:ext>
                 </a:extLst>
               </a:tr>
@@ -5513,7 +5513,7 @@
                 </a:tc>
                 <a:extLst>
                   <a:ext uri="{0D108BD9-81ED-4DB2-BD59-A6C34878D82A}">
-                    <a16:rowId xmlns="" xmlns:a16="http://schemas.microsoft.com/office/drawing/2014/main" val="10002"/>
+                    <a16:rowId xmlns:a16="http://schemas.microsoft.com/office/drawing/2014/main" xmlns="" val="10002"/>
                   </a:ext>
                 </a:extLst>
               </a:tr>
@@ -5729,7 +5729,7 @@
                 </a:tc>
                 <a:extLst>
                   <a:ext uri="{0D108BD9-81ED-4DB2-BD59-A6C34878D82A}">
-                    <a16:rowId xmlns="" xmlns:a16="http://schemas.microsoft.com/office/drawing/2014/main" val="10003"/>
+                    <a16:rowId xmlns:a16="http://schemas.microsoft.com/office/drawing/2014/main" xmlns="" val="10003"/>
                   </a:ext>
                 </a:extLst>
               </a:tr>
@@ -5945,7 +5945,7 @@
                 </a:tc>
                 <a:extLst>
                   <a:ext uri="{0D108BD9-81ED-4DB2-BD59-A6C34878D82A}">
-                    <a16:rowId xmlns="" xmlns:a16="http://schemas.microsoft.com/office/drawing/2014/main" val="10004"/>
+                    <a16:rowId xmlns:a16="http://schemas.microsoft.com/office/drawing/2014/main" xmlns="" val="10004"/>
                   </a:ext>
                 </a:extLst>
               </a:tr>
@@ -6187,7 +6187,7 @@
                 </a:tc>
                 <a:extLst>
                   <a:ext uri="{0D108BD9-81ED-4DB2-BD59-A6C34878D82A}">
-                    <a16:rowId xmlns="" xmlns:a16="http://schemas.microsoft.com/office/drawing/2014/main" val="10005"/>
+                    <a16:rowId xmlns:a16="http://schemas.microsoft.com/office/drawing/2014/main" xmlns="" val="10005"/>
                   </a:ext>
                 </a:extLst>
               </a:tr>
@@ -6429,7 +6429,7 @@
                 </a:tc>
                 <a:extLst>
                   <a:ext uri="{0D108BD9-81ED-4DB2-BD59-A6C34878D82A}">
-                    <a16:rowId xmlns="" xmlns:a16="http://schemas.microsoft.com/office/drawing/2014/main" val="10006"/>
+                    <a16:rowId xmlns:a16="http://schemas.microsoft.com/office/drawing/2014/main" xmlns="" val="10006"/>
                   </a:ext>
                 </a:extLst>
               </a:tr>
@@ -6675,7 +6675,7 @@
                 </a:tc>
                 <a:extLst>
                   <a:ext uri="{0D108BD9-81ED-4DB2-BD59-A6C34878D82A}">
-                    <a16:rowId xmlns="" xmlns:a16="http://schemas.microsoft.com/office/drawing/2014/main" val="10007"/>
+                    <a16:rowId xmlns:a16="http://schemas.microsoft.com/office/drawing/2014/main" xmlns="" val="10007"/>
                   </a:ext>
                 </a:extLst>
               </a:tr>
@@ -6917,7 +6917,7 @@
                 </a:tc>
                 <a:extLst>
                   <a:ext uri="{0D108BD9-81ED-4DB2-BD59-A6C34878D82A}">
-                    <a16:rowId xmlns="" xmlns:a16="http://schemas.microsoft.com/office/drawing/2014/main" val="10008"/>
+                    <a16:rowId xmlns:a16="http://schemas.microsoft.com/office/drawing/2014/main" xmlns="" val="10008"/>
                   </a:ext>
                 </a:extLst>
               </a:tr>
@@ -7184,7 +7184,7 @@
                 </a:tc>
                 <a:extLst>
                   <a:ext uri="{0D108BD9-81ED-4DB2-BD59-A6C34878D82A}">
-                    <a16:rowId xmlns="" xmlns:a16="http://schemas.microsoft.com/office/drawing/2014/main" val="10009"/>
+                    <a16:rowId xmlns:a16="http://schemas.microsoft.com/office/drawing/2014/main" xmlns="" val="10009"/>
                   </a:ext>
                 </a:extLst>
               </a:tr>
@@ -7429,7 +7429,7 @@
                 </a:tc>
                 <a:extLst>
                   <a:ext uri="{0D108BD9-81ED-4DB2-BD59-A6C34878D82A}">
-                    <a16:rowId xmlns="" xmlns:a16="http://schemas.microsoft.com/office/drawing/2014/main" val="10010"/>
+                    <a16:rowId xmlns:a16="http://schemas.microsoft.com/office/drawing/2014/main" xmlns="" val="10010"/>
                   </a:ext>
                 </a:extLst>
               </a:tr>
@@ -7659,7 +7659,7 @@
                 </a:tc>
                 <a:extLst>
                   <a:ext uri="{0D108BD9-81ED-4DB2-BD59-A6C34878D82A}">
-                    <a16:rowId xmlns="" xmlns:a16="http://schemas.microsoft.com/office/drawing/2014/main" val="10011"/>
+                    <a16:rowId xmlns:a16="http://schemas.microsoft.com/office/drawing/2014/main" xmlns="" val="10011"/>
                   </a:ext>
                 </a:extLst>
               </a:tr>
@@ -7890,7 +7890,7 @@
                 </a:tc>
                 <a:extLst>
                   <a:ext uri="{0D108BD9-81ED-4DB2-BD59-A6C34878D82A}">
-                    <a16:rowId xmlns="" xmlns:a16="http://schemas.microsoft.com/office/drawing/2014/main" val="10012"/>
+                    <a16:rowId xmlns:a16="http://schemas.microsoft.com/office/drawing/2014/main" xmlns="" val="10012"/>
                   </a:ext>
                 </a:extLst>
               </a:tr>
@@ -8132,7 +8132,7 @@
                 </a:tc>
                 <a:extLst>
                   <a:ext uri="{0D108BD9-81ED-4DB2-BD59-A6C34878D82A}">
-                    <a16:rowId xmlns="" xmlns:a16="http://schemas.microsoft.com/office/drawing/2014/main" val="10013"/>
+                    <a16:rowId xmlns:a16="http://schemas.microsoft.com/office/drawing/2014/main" xmlns="" val="10013"/>
                   </a:ext>
                 </a:extLst>
               </a:tr>
@@ -8230,63 +8230,63 @@
                 <a:gridCol w="996402">
                   <a:extLst>
                     <a:ext uri="{9D8B030D-6E8A-4147-A177-3AD203B41FA5}">
-                      <a16:colId xmlns="" xmlns:a16="http://schemas.microsoft.com/office/drawing/2014/main" val="20000"/>
+                      <a16:colId xmlns:a16="http://schemas.microsoft.com/office/drawing/2014/main" xmlns="" val="20000"/>
                     </a:ext>
                   </a:extLst>
                 </a:gridCol>
                 <a:gridCol w="2159760">
                   <a:extLst>
                     <a:ext uri="{9D8B030D-6E8A-4147-A177-3AD203B41FA5}">
-                      <a16:colId xmlns="" xmlns:a16="http://schemas.microsoft.com/office/drawing/2014/main" val="20001"/>
+                      <a16:colId xmlns:a16="http://schemas.microsoft.com/office/drawing/2014/main" xmlns="" val="20001"/>
                     </a:ext>
                   </a:extLst>
                 </a:gridCol>
                 <a:gridCol w="1002069">
                   <a:extLst>
                     <a:ext uri="{9D8B030D-6E8A-4147-A177-3AD203B41FA5}">
-                      <a16:colId xmlns="" xmlns:a16="http://schemas.microsoft.com/office/drawing/2014/main" val="20002"/>
+                      <a16:colId xmlns:a16="http://schemas.microsoft.com/office/drawing/2014/main" xmlns="" val="20002"/>
                     </a:ext>
                   </a:extLst>
                 </a:gridCol>
                 <a:gridCol w="1062092">
                   <a:extLst>
                     <a:ext uri="{9D8B030D-6E8A-4147-A177-3AD203B41FA5}">
-                      <a16:colId xmlns="" xmlns:a16="http://schemas.microsoft.com/office/drawing/2014/main" val="20003"/>
+                      <a16:colId xmlns:a16="http://schemas.microsoft.com/office/drawing/2014/main" xmlns="" val="20003"/>
                     </a:ext>
                   </a:extLst>
                 </a:gridCol>
                 <a:gridCol w="505530">
                   <a:extLst>
                     <a:ext uri="{9D8B030D-6E8A-4147-A177-3AD203B41FA5}">
-                      <a16:colId xmlns="" xmlns:a16="http://schemas.microsoft.com/office/drawing/2014/main" val="20004"/>
+                      <a16:colId xmlns:a16="http://schemas.microsoft.com/office/drawing/2014/main" xmlns="" val="20004"/>
                     </a:ext>
                   </a:extLst>
                 </a:gridCol>
                 <a:gridCol w="574635">
                   <a:extLst>
                     <a:ext uri="{9D8B030D-6E8A-4147-A177-3AD203B41FA5}">
-                      <a16:colId xmlns="" xmlns:a16="http://schemas.microsoft.com/office/drawing/2014/main" val="20005"/>
+                      <a16:colId xmlns:a16="http://schemas.microsoft.com/office/drawing/2014/main" xmlns="" val="20005"/>
                     </a:ext>
                   </a:extLst>
                 </a:gridCol>
                 <a:gridCol w="696898">
                   <a:extLst>
                     <a:ext uri="{9D8B030D-6E8A-4147-A177-3AD203B41FA5}">
-                      <a16:colId xmlns="" xmlns:a16="http://schemas.microsoft.com/office/drawing/2014/main" val="20006"/>
+                      <a16:colId xmlns:a16="http://schemas.microsoft.com/office/drawing/2014/main" xmlns="" val="20006"/>
                     </a:ext>
                   </a:extLst>
                 </a:gridCol>
                 <a:gridCol w="745803">
                   <a:extLst>
                     <a:ext uri="{9D8B030D-6E8A-4147-A177-3AD203B41FA5}">
-                      <a16:colId xmlns="" xmlns:a16="http://schemas.microsoft.com/office/drawing/2014/main" val="20007"/>
+                      <a16:colId xmlns:a16="http://schemas.microsoft.com/office/drawing/2014/main" xmlns="" val="20007"/>
                     </a:ext>
                   </a:extLst>
                 </a:gridCol>
                 <a:gridCol w="476825">
                   <a:extLst>
                     <a:ext uri="{9D8B030D-6E8A-4147-A177-3AD203B41FA5}">
-                      <a16:colId xmlns="" xmlns:a16="http://schemas.microsoft.com/office/drawing/2014/main" val="20008"/>
+                      <a16:colId xmlns:a16="http://schemas.microsoft.com/office/drawing/2014/main" xmlns="" val="20008"/>
                     </a:ext>
                   </a:extLst>
                 </a:gridCol>
@@ -8707,7 +8707,7 @@
                 </a:tc>
                 <a:extLst>
                   <a:ext uri="{0D108BD9-81ED-4DB2-BD59-A6C34878D82A}">
-                    <a16:rowId xmlns="" xmlns:a16="http://schemas.microsoft.com/office/drawing/2014/main" val="10000"/>
+                    <a16:rowId xmlns:a16="http://schemas.microsoft.com/office/drawing/2014/main" xmlns="" val="10000"/>
                   </a:ext>
                 </a:extLst>
               </a:tr>
@@ -8952,7 +8952,7 @@
                 </a:tc>
                 <a:extLst>
                   <a:ext uri="{0D108BD9-81ED-4DB2-BD59-A6C34878D82A}">
-                    <a16:rowId xmlns="" xmlns:a16="http://schemas.microsoft.com/office/drawing/2014/main" val="10001"/>
+                    <a16:rowId xmlns:a16="http://schemas.microsoft.com/office/drawing/2014/main" xmlns="" val="10001"/>
                   </a:ext>
                 </a:extLst>
               </a:tr>
@@ -9331,7 +9331,7 @@
                 </a:tc>
                 <a:extLst>
                   <a:ext uri="{0D108BD9-81ED-4DB2-BD59-A6C34878D82A}">
-                    <a16:rowId xmlns="" xmlns:a16="http://schemas.microsoft.com/office/drawing/2014/main" val="10002"/>
+                    <a16:rowId xmlns:a16="http://schemas.microsoft.com/office/drawing/2014/main" xmlns="" val="10002"/>
                   </a:ext>
                 </a:extLst>
               </a:tr>
@@ -9675,7 +9675,7 @@
                 </a:tc>
                 <a:extLst>
                   <a:ext uri="{0D108BD9-81ED-4DB2-BD59-A6C34878D82A}">
-                    <a16:rowId xmlns="" xmlns:a16="http://schemas.microsoft.com/office/drawing/2014/main" val="10003"/>
+                    <a16:rowId xmlns:a16="http://schemas.microsoft.com/office/drawing/2014/main" xmlns="" val="10003"/>
                   </a:ext>
                 </a:extLst>
               </a:tr>
@@ -10019,7 +10019,7 @@
                 </a:tc>
                 <a:extLst>
                   <a:ext uri="{0D108BD9-81ED-4DB2-BD59-A6C34878D82A}">
-                    <a16:rowId xmlns="" xmlns:a16="http://schemas.microsoft.com/office/drawing/2014/main" val="10004"/>
+                    <a16:rowId xmlns:a16="http://schemas.microsoft.com/office/drawing/2014/main" xmlns="" val="10004"/>
                   </a:ext>
                 </a:extLst>
               </a:tr>
@@ -10386,7 +10386,7 @@
                 </a:tc>
                 <a:extLst>
                   <a:ext uri="{0D108BD9-81ED-4DB2-BD59-A6C34878D82A}">
-                    <a16:rowId xmlns="" xmlns:a16="http://schemas.microsoft.com/office/drawing/2014/main" val="10005"/>
+                    <a16:rowId xmlns:a16="http://schemas.microsoft.com/office/drawing/2014/main" xmlns="" val="10005"/>
                   </a:ext>
                 </a:extLst>
               </a:tr>
@@ -10753,7 +10753,7 @@
                 </a:tc>
                 <a:extLst>
                   <a:ext uri="{0D108BD9-81ED-4DB2-BD59-A6C34878D82A}">
-                    <a16:rowId xmlns="" xmlns:a16="http://schemas.microsoft.com/office/drawing/2014/main" val="10006"/>
+                    <a16:rowId xmlns:a16="http://schemas.microsoft.com/office/drawing/2014/main" xmlns="" val="10006"/>
                   </a:ext>
                 </a:extLst>
               </a:tr>
@@ -11120,7 +11120,7 @@
                 </a:tc>
                 <a:extLst>
                   <a:ext uri="{0D108BD9-81ED-4DB2-BD59-A6C34878D82A}">
-                    <a16:rowId xmlns="" xmlns:a16="http://schemas.microsoft.com/office/drawing/2014/main" val="10007"/>
+                    <a16:rowId xmlns:a16="http://schemas.microsoft.com/office/drawing/2014/main" xmlns="" val="10007"/>
                   </a:ext>
                 </a:extLst>
               </a:tr>
@@ -11464,7 +11464,7 @@
                 </a:tc>
                 <a:extLst>
                   <a:ext uri="{0D108BD9-81ED-4DB2-BD59-A6C34878D82A}">
-                    <a16:rowId xmlns="" xmlns:a16="http://schemas.microsoft.com/office/drawing/2014/main" val="10008"/>
+                    <a16:rowId xmlns:a16="http://schemas.microsoft.com/office/drawing/2014/main" xmlns="" val="10008"/>
                   </a:ext>
                 </a:extLst>
               </a:tr>
@@ -11808,7 +11808,7 @@
                 </a:tc>
                 <a:extLst>
                   <a:ext uri="{0D108BD9-81ED-4DB2-BD59-A6C34878D82A}">
-                    <a16:rowId xmlns="" xmlns:a16="http://schemas.microsoft.com/office/drawing/2014/main" val="10009"/>
+                    <a16:rowId xmlns:a16="http://schemas.microsoft.com/office/drawing/2014/main" xmlns="" val="10009"/>
                   </a:ext>
                 </a:extLst>
               </a:tr>
@@ -12152,7 +12152,7 @@
                 </a:tc>
                 <a:extLst>
                   <a:ext uri="{0D108BD9-81ED-4DB2-BD59-A6C34878D82A}">
-                    <a16:rowId xmlns="" xmlns:a16="http://schemas.microsoft.com/office/drawing/2014/main" val="10010"/>
+                    <a16:rowId xmlns:a16="http://schemas.microsoft.com/office/drawing/2014/main" xmlns="" val="10010"/>
                   </a:ext>
                 </a:extLst>
               </a:tr>
@@ -12519,7 +12519,7 @@
                 </a:tc>
                 <a:extLst>
                   <a:ext uri="{0D108BD9-81ED-4DB2-BD59-A6C34878D82A}">
-                    <a16:rowId xmlns="" xmlns:a16="http://schemas.microsoft.com/office/drawing/2014/main" val="10011"/>
+                    <a16:rowId xmlns:a16="http://schemas.microsoft.com/office/drawing/2014/main" xmlns="" val="10011"/>
                   </a:ext>
                 </a:extLst>
               </a:tr>
@@ -12886,7 +12886,7 @@
                 </a:tc>
                 <a:extLst>
                   <a:ext uri="{0D108BD9-81ED-4DB2-BD59-A6C34878D82A}">
-                    <a16:rowId xmlns="" xmlns:a16="http://schemas.microsoft.com/office/drawing/2014/main" val="10012"/>
+                    <a16:rowId xmlns:a16="http://schemas.microsoft.com/office/drawing/2014/main" xmlns="" val="10012"/>
                   </a:ext>
                 </a:extLst>
               </a:tr>
@@ -13253,7 +13253,7 @@
                 </a:tc>
                 <a:extLst>
                   <a:ext uri="{0D108BD9-81ED-4DB2-BD59-A6C34878D82A}">
-                    <a16:rowId xmlns="" xmlns:a16="http://schemas.microsoft.com/office/drawing/2014/main" val="10013"/>
+                    <a16:rowId xmlns:a16="http://schemas.microsoft.com/office/drawing/2014/main" xmlns="" val="10013"/>
                   </a:ext>
                 </a:extLst>
               </a:tr>
@@ -13620,7 +13620,7 @@
                 </a:tc>
                 <a:extLst>
                   <a:ext uri="{0D108BD9-81ED-4DB2-BD59-A6C34878D82A}">
-                    <a16:rowId xmlns="" xmlns:a16="http://schemas.microsoft.com/office/drawing/2014/main" val="10014"/>
+                    <a16:rowId xmlns:a16="http://schemas.microsoft.com/office/drawing/2014/main" xmlns="" val="10014"/>
                   </a:ext>
                 </a:extLst>
               </a:tr>
@@ -13670,7 +13670,7 @@
           <p:cNvPr id="5" name="Text Placeholder 4">
             <a:extLst>
               <a:ext uri="{FF2B5EF4-FFF2-40B4-BE49-F238E27FC236}">
-                <a16:creationId xmlns="" xmlns:a16="http://schemas.microsoft.com/office/drawing/2014/main" id="{4297ADF3-BC92-B548-B50D-6294C3AFCBC5}"/>
+                <a16:creationId xmlns:a16="http://schemas.microsoft.com/office/drawing/2014/main" xmlns="" id="{4297ADF3-BC92-B548-B50D-6294C3AFCBC5}"/>
               </a:ext>
             </a:extLst>
           </p:cNvPr>
@@ -13703,7 +13703,7 @@
           <p:cNvPr id="4" name="Title 3">
             <a:extLst>
               <a:ext uri="{FF2B5EF4-FFF2-40B4-BE49-F238E27FC236}">
-                <a16:creationId xmlns="" xmlns:a16="http://schemas.microsoft.com/office/drawing/2014/main" id="{5AC4E82C-61B5-3F4E-B395-7FB7D51AAAA4}"/>
+                <a16:creationId xmlns:a16="http://schemas.microsoft.com/office/drawing/2014/main" xmlns="" id="{5AC4E82C-61B5-3F4E-B395-7FB7D51AAAA4}"/>
               </a:ext>
             </a:extLst>
           </p:cNvPr>
@@ -13723,15 +13723,7 @@
           <a:p>
             <a:r>
               <a:rPr lang="en-US" sz="2800" dirty="0" smtClean="0"/>
-              <a:t>Use </a:t>
-            </a:r>
-            <a:r>
-              <a:rPr lang="en-US" sz="2800" dirty="0" smtClean="0"/>
-              <a:t>Cases, State Transitions &amp; </a:t>
-            </a:r>
-            <a:r>
-              <a:rPr lang="en-US" sz="2800" dirty="0" smtClean="0"/>
-              <a:t>Interaction Diagrams</a:t>
+              <a:t>Use Cases, State Transitions &amp; Interaction Diagrams</a:t>
             </a:r>
             <a:endParaRPr lang="en-US" sz="2800" dirty="0"/>
           </a:p>
@@ -13776,95 +13768,6 @@
       </p:grpSpPr>
       <p:sp>
         <p:nvSpPr>
-          <p:cNvPr id="27" name="Rectangle 26"/>
-          <p:cNvSpPr/>
-          <p:nvPr/>
-        </p:nvSpPr>
-        <p:spPr>
-          <a:xfrm>
-            <a:off x="6067006" y="1307790"/>
-            <a:ext cx="2623161" cy="3361795"/>
-          </a:xfrm>
-          <a:prstGeom prst="rect">
-            <a:avLst/>
-          </a:prstGeom>
-        </p:spPr>
-        <p:style>
-          <a:lnRef idx="1">
-            <a:schemeClr val="accent1"/>
-          </a:lnRef>
-          <a:fillRef idx="2">
-            <a:schemeClr val="accent1"/>
-          </a:fillRef>
-          <a:effectRef idx="1">
-            <a:schemeClr val="accent1"/>
-          </a:effectRef>
-          <a:fontRef idx="minor">
-            <a:schemeClr val="dk1"/>
-          </a:fontRef>
-        </p:style>
-        <p:txBody>
-          <a:bodyPr rtlCol="0" anchor="ctr"/>
-          <a:lstStyle/>
-          <a:p>
-            <a:pPr algn="ctr"/>
-            <a:r>
-              <a:rPr lang="en-US" dirty="0" smtClean="0"/>
-              <a:t>Registration &amp; Log-in</a:t>
-            </a:r>
-          </a:p>
-          <a:p>
-            <a:pPr algn="ctr"/>
-            <a:endParaRPr lang="en-US" dirty="0"/>
-          </a:p>
-          <a:p>
-            <a:pPr algn="ctr"/>
-            <a:endParaRPr lang="en-US" dirty="0" smtClean="0"/>
-          </a:p>
-          <a:p>
-            <a:pPr algn="ctr"/>
-            <a:endParaRPr lang="en-US" dirty="0"/>
-          </a:p>
-          <a:p>
-            <a:pPr algn="ctr"/>
-            <a:endParaRPr lang="en-US" dirty="0" smtClean="0"/>
-          </a:p>
-          <a:p>
-            <a:pPr algn="ctr"/>
-            <a:endParaRPr lang="en-US" dirty="0"/>
-          </a:p>
-          <a:p>
-            <a:pPr algn="ctr"/>
-            <a:endParaRPr lang="en-US" dirty="0" smtClean="0"/>
-          </a:p>
-          <a:p>
-            <a:pPr algn="ctr"/>
-            <a:endParaRPr lang="en-US" dirty="0"/>
-          </a:p>
-          <a:p>
-            <a:pPr algn="ctr"/>
-            <a:endParaRPr lang="en-US" dirty="0" smtClean="0"/>
-          </a:p>
-          <a:p>
-            <a:pPr algn="ctr"/>
-            <a:endParaRPr lang="en-US" dirty="0"/>
-          </a:p>
-          <a:p>
-            <a:pPr algn="ctr"/>
-            <a:endParaRPr lang="en-US" sz="1200" dirty="0" smtClean="0"/>
-          </a:p>
-          <a:p>
-            <a:pPr algn="ctr"/>
-            <a:endParaRPr lang="en-US" sz="1200" dirty="0"/>
-          </a:p>
-          <a:p>
-            <a:pPr algn="ctr"/>
-            <a:endParaRPr lang="en-US" sz="1200" dirty="0"/>
-          </a:p>
-        </p:txBody>
-      </p:sp>
-      <p:sp>
-        <p:nvSpPr>
           <p:cNvPr id="2" name="Title 1"/>
           <p:cNvSpPr>
             <a:spLocks noGrp="1"/>
@@ -13882,11 +13785,7 @@
           <a:p>
             <a:r>
               <a:rPr lang="en-US" dirty="0" smtClean="0"/>
-              <a:t>Register &amp; Login Use </a:t>
-            </a:r>
-            <a:r>
-              <a:rPr lang="en-US" dirty="0" smtClean="0"/>
-              <a:t>Case</a:t>
+              <a:t>Register &amp; Login Use Case</a:t>
             </a:r>
             <a:endParaRPr lang="en-US" dirty="0"/>
           </a:p>
@@ -13922,301 +13821,15 @@
           </a:ln>
         </p:spPr>
       </p:pic>
-      <p:sp>
-        <p:nvSpPr>
-          <p:cNvPr id="18" name="Content Placeholder 17"/>
-          <p:cNvSpPr>
-            <a:spLocks noGrp="1"/>
-          </p:cNvSpPr>
+      <p:pic>
+        <p:nvPicPr>
+          <p:cNvPr id="9" name="Content Placeholder 8" descr="Login and Registration.png"/>
+          <p:cNvPicPr>
+            <a:picLocks noGrp="1" noChangeAspect="1"/>
+          </p:cNvPicPr>
           <p:nvPr>
             <p:ph sz="quarter" idx="2"/>
           </p:nvPr>
-        </p:nvSpPr>
-        <p:spPr>
-          <a:xfrm>
-            <a:off x="4844901" y="1188720"/>
-            <a:ext cx="3886200" cy="3562705"/>
-          </a:xfrm>
-          <a:ln>
-            <a:solidFill>
-              <a:schemeClr val="tx1"/>
-            </a:solidFill>
-          </a:ln>
-        </p:spPr>
-        <p:txBody>
-          <a:bodyPr/>
-          <a:lstStyle/>
-          <a:p>
-            <a:pPr marL="0" indent="0">
-              <a:buNone/>
-            </a:pPr>
-            <a:r>
-              <a:rPr lang="en-US" dirty="0" smtClean="0"/>
-              <a:t> </a:t>
-            </a:r>
-            <a:endParaRPr lang="en-US" dirty="0"/>
-          </a:p>
-        </p:txBody>
-      </p:sp>
-      <p:sp>
-        <p:nvSpPr>
-          <p:cNvPr id="21" name="Oval 20"/>
-          <p:cNvSpPr/>
-          <p:nvPr/>
-        </p:nvSpPr>
-        <p:spPr>
-          <a:xfrm>
-            <a:off x="6253498" y="1856523"/>
-            <a:ext cx="1140612" cy="320040"/>
-          </a:xfrm>
-          <a:prstGeom prst="ellipse">
-            <a:avLst/>
-          </a:prstGeom>
-        </p:spPr>
-        <p:style>
-          <a:lnRef idx="1">
-            <a:schemeClr val="accent4"/>
-          </a:lnRef>
-          <a:fillRef idx="2">
-            <a:schemeClr val="accent4"/>
-          </a:fillRef>
-          <a:effectRef idx="1">
-            <a:schemeClr val="accent4"/>
-          </a:effectRef>
-          <a:fontRef idx="minor">
-            <a:schemeClr val="dk1"/>
-          </a:fontRef>
-        </p:style>
-        <p:txBody>
-          <a:bodyPr rtlCol="0" anchor="ctr"/>
-          <a:lstStyle/>
-          <a:p>
-            <a:pPr algn="ctr"/>
-            <a:r>
-              <a:rPr lang="en-US" sz="1000" dirty="0" smtClean="0"/>
-              <a:t>Register</a:t>
-            </a:r>
-            <a:endParaRPr lang="en-US" sz="1000" dirty="0"/>
-          </a:p>
-        </p:txBody>
-      </p:sp>
-      <p:sp>
-        <p:nvSpPr>
-          <p:cNvPr id="22" name="Oval 21"/>
-          <p:cNvSpPr/>
-          <p:nvPr/>
-        </p:nvSpPr>
-        <p:spPr>
-          <a:xfrm>
-            <a:off x="6190221" y="2738779"/>
-            <a:ext cx="1140612" cy="320040"/>
-          </a:xfrm>
-          <a:prstGeom prst="ellipse">
-            <a:avLst/>
-          </a:prstGeom>
-        </p:spPr>
-        <p:style>
-          <a:lnRef idx="1">
-            <a:schemeClr val="accent4"/>
-          </a:lnRef>
-          <a:fillRef idx="2">
-            <a:schemeClr val="accent4"/>
-          </a:fillRef>
-          <a:effectRef idx="1">
-            <a:schemeClr val="accent4"/>
-          </a:effectRef>
-          <a:fontRef idx="minor">
-            <a:schemeClr val="dk1"/>
-          </a:fontRef>
-        </p:style>
-        <p:txBody>
-          <a:bodyPr rtlCol="0" anchor="ctr"/>
-          <a:lstStyle/>
-          <a:p>
-            <a:pPr algn="ctr"/>
-            <a:r>
-              <a:rPr lang="en-US" sz="1000" dirty="0" smtClean="0"/>
-              <a:t>Login</a:t>
-            </a:r>
-            <a:endParaRPr lang="en-US" sz="1000" dirty="0"/>
-          </a:p>
-        </p:txBody>
-      </p:sp>
-      <p:sp>
-        <p:nvSpPr>
-          <p:cNvPr id="23" name="Oval 22"/>
-          <p:cNvSpPr/>
-          <p:nvPr/>
-        </p:nvSpPr>
-        <p:spPr>
-          <a:xfrm>
-            <a:off x="7495891" y="2074348"/>
-            <a:ext cx="1140612" cy="320040"/>
-          </a:xfrm>
-          <a:prstGeom prst="ellipse">
-            <a:avLst/>
-          </a:prstGeom>
-        </p:spPr>
-        <p:style>
-          <a:lnRef idx="1">
-            <a:schemeClr val="accent4"/>
-          </a:lnRef>
-          <a:fillRef idx="2">
-            <a:schemeClr val="accent4"/>
-          </a:fillRef>
-          <a:effectRef idx="1">
-            <a:schemeClr val="accent4"/>
-          </a:effectRef>
-          <a:fontRef idx="minor">
-            <a:schemeClr val="dk1"/>
-          </a:fontRef>
-        </p:style>
-        <p:txBody>
-          <a:bodyPr lIns="0" rIns="0" rtlCol="0" anchor="ctr"/>
-          <a:lstStyle/>
-          <a:p>
-            <a:pPr algn="ctr"/>
-            <a:r>
-              <a:rPr lang="en-US" sz="1000" dirty="0" smtClean="0"/>
-              <a:t>Login with no Registration</a:t>
-            </a:r>
-            <a:endParaRPr lang="en-US" sz="1000" dirty="0"/>
-          </a:p>
-        </p:txBody>
-      </p:sp>
-      <p:sp>
-        <p:nvSpPr>
-          <p:cNvPr id="24" name="Oval 23"/>
-          <p:cNvSpPr/>
-          <p:nvPr/>
-        </p:nvSpPr>
-        <p:spPr>
-          <a:xfrm>
-            <a:off x="6149240" y="3770602"/>
-            <a:ext cx="1140612" cy="320040"/>
-          </a:xfrm>
-          <a:prstGeom prst="ellipse">
-            <a:avLst/>
-          </a:prstGeom>
-        </p:spPr>
-        <p:style>
-          <a:lnRef idx="1">
-            <a:schemeClr val="accent4"/>
-          </a:lnRef>
-          <a:fillRef idx="2">
-            <a:schemeClr val="accent4"/>
-          </a:fillRef>
-          <a:effectRef idx="1">
-            <a:schemeClr val="accent4"/>
-          </a:effectRef>
-          <a:fontRef idx="minor">
-            <a:schemeClr val="dk1"/>
-          </a:fontRef>
-        </p:style>
-        <p:txBody>
-          <a:bodyPr lIns="0" rIns="0" rtlCol="0" anchor="ctr"/>
-          <a:lstStyle/>
-          <a:p>
-            <a:pPr algn="ctr"/>
-            <a:r>
-              <a:rPr lang="en-US" sz="1000" dirty="0" smtClean="0"/>
-              <a:t>Authenticate SSO</a:t>
-            </a:r>
-            <a:endParaRPr lang="en-US" sz="1000" dirty="0"/>
-          </a:p>
-        </p:txBody>
-      </p:sp>
-      <p:sp>
-        <p:nvSpPr>
-          <p:cNvPr id="25" name="Oval 24"/>
-          <p:cNvSpPr/>
-          <p:nvPr/>
-        </p:nvSpPr>
-        <p:spPr>
-          <a:xfrm>
-            <a:off x="7502165" y="3424920"/>
-            <a:ext cx="1140612" cy="320040"/>
-          </a:xfrm>
-          <a:prstGeom prst="ellipse">
-            <a:avLst/>
-          </a:prstGeom>
-        </p:spPr>
-        <p:style>
-          <a:lnRef idx="1">
-            <a:schemeClr val="accent4"/>
-          </a:lnRef>
-          <a:fillRef idx="2">
-            <a:schemeClr val="accent4"/>
-          </a:fillRef>
-          <a:effectRef idx="1">
-            <a:schemeClr val="accent4"/>
-          </a:effectRef>
-          <a:fontRef idx="minor">
-            <a:schemeClr val="dk1"/>
-          </a:fontRef>
-        </p:style>
-        <p:txBody>
-          <a:bodyPr rtlCol="0" anchor="ctr"/>
-          <a:lstStyle/>
-          <a:p>
-            <a:pPr algn="ctr"/>
-            <a:r>
-              <a:rPr lang="en-US" sz="1000" dirty="0" smtClean="0"/>
-              <a:t>Login Failed</a:t>
-            </a:r>
-            <a:endParaRPr lang="en-US" sz="1000" dirty="0"/>
-          </a:p>
-        </p:txBody>
-      </p:sp>
-      <p:sp>
-        <p:nvSpPr>
-          <p:cNvPr id="26" name="Oval 25"/>
-          <p:cNvSpPr/>
-          <p:nvPr/>
-        </p:nvSpPr>
-        <p:spPr>
-          <a:xfrm>
-            <a:off x="7413398" y="4249670"/>
-            <a:ext cx="1140612" cy="320040"/>
-          </a:xfrm>
-          <a:prstGeom prst="ellipse">
-            <a:avLst/>
-          </a:prstGeom>
-        </p:spPr>
-        <p:style>
-          <a:lnRef idx="1">
-            <a:schemeClr val="accent4"/>
-          </a:lnRef>
-          <a:fillRef idx="2">
-            <a:schemeClr val="accent4"/>
-          </a:fillRef>
-          <a:effectRef idx="1">
-            <a:schemeClr val="accent4"/>
-          </a:effectRef>
-          <a:fontRef idx="minor">
-            <a:schemeClr val="dk1"/>
-          </a:fontRef>
-        </p:style>
-        <p:txBody>
-          <a:bodyPr rtlCol="0" anchor="ctr"/>
-          <a:lstStyle/>
-          <a:p>
-            <a:pPr algn="ctr"/>
-            <a:r>
-              <a:rPr lang="en-US" sz="1000" dirty="0" smtClean="0"/>
-              <a:t>Invalid Password</a:t>
-            </a:r>
-            <a:endParaRPr lang="en-US" sz="1000" dirty="0"/>
-          </a:p>
-        </p:txBody>
-      </p:sp>
-      <p:pic>
-        <p:nvPicPr>
-          <p:cNvPr id="30" name="Picture 29" descr="UML_Actor.png"/>
-          <p:cNvPicPr>
-            <a:picLocks noChangeAspect="1"/>
-          </p:cNvPicPr>
-          <p:nvPr/>
         </p:nvPicPr>
         <p:blipFill>
           <a:blip r:embed="rId3">
@@ -14226,517 +13839,16 @@
               </a:ext>
             </a:extLst>
           </a:blip>
+          <a:srcRect l="2620" r="2620"/>
           <a:stretch>
             <a:fillRect/>
           </a:stretch>
         </p:blipFill>
         <p:spPr>
           <a:xfrm>
-            <a:off x="4916507" y="1622963"/>
-            <a:ext cx="468201" cy="764485"/>
+            <a:off x="4845050" y="1192213"/>
+            <a:ext cx="3886200" cy="3562350"/>
           </a:xfrm>
-          <a:prstGeom prst="rect">
-            <a:avLst/>
-          </a:prstGeom>
-        </p:spPr>
-      </p:pic>
-      <p:pic>
-        <p:nvPicPr>
-          <p:cNvPr id="31" name="Picture 30" descr="UML_Actor.png"/>
-          <p:cNvPicPr>
-            <a:picLocks noChangeAspect="1"/>
-          </p:cNvPicPr>
-          <p:nvPr/>
-        </p:nvPicPr>
-        <p:blipFill>
-          <a:blip r:embed="rId3">
-            <a:extLst>
-              <a:ext uri="{28A0092B-C50C-407E-A947-70E740481C1C}">
-                <a14:useLocalDpi xmlns:a14="http://schemas.microsoft.com/office/drawing/2010/main" val="0"/>
-              </a:ext>
-            </a:extLst>
-          </a:blip>
-          <a:stretch>
-            <a:fillRect/>
-          </a:stretch>
-        </p:blipFill>
-        <p:spPr>
-          <a:xfrm>
-            <a:off x="4871529" y="3034749"/>
-            <a:ext cx="421856" cy="688813"/>
-          </a:xfrm>
-          <a:prstGeom prst="rect">
-            <a:avLst/>
-          </a:prstGeom>
-        </p:spPr>
-      </p:pic>
-      <p:pic>
-        <p:nvPicPr>
-          <p:cNvPr id="47" name="Picture 46" descr="UML_Actor.png"/>
-          <p:cNvPicPr>
-            <a:picLocks noChangeAspect="1"/>
-          </p:cNvPicPr>
-          <p:nvPr/>
-        </p:nvPicPr>
-        <p:blipFill>
-          <a:blip r:embed="rId3">
-            <a:extLst>
-              <a:ext uri="{28A0092B-C50C-407E-A947-70E740481C1C}">
-                <a14:useLocalDpi xmlns:a14="http://schemas.microsoft.com/office/drawing/2010/main" val="0"/>
-              </a:ext>
-            </a:extLst>
-          </a:blip>
-          <a:stretch>
-            <a:fillRect/>
-          </a:stretch>
-        </p:blipFill>
-        <p:spPr>
-          <a:xfrm>
-            <a:off x="5532133" y="2360897"/>
-            <a:ext cx="506085" cy="826343"/>
-          </a:xfrm>
-          <a:prstGeom prst="rect">
-            <a:avLst/>
-          </a:prstGeom>
-        </p:spPr>
-      </p:pic>
-      <p:cxnSp>
-        <p:nvCxnSpPr>
-          <p:cNvPr id="54" name="Straight Connector 53"/>
-          <p:cNvCxnSpPr>
-            <a:endCxn id="21" idx="4"/>
-          </p:cNvCxnSpPr>
-          <p:nvPr/>
-        </p:nvCxnSpPr>
-        <p:spPr>
-          <a:xfrm flipV="1">
-            <a:off x="5980060" y="2176563"/>
-            <a:ext cx="843744" cy="305961"/>
-          </a:xfrm>
-          <a:prstGeom prst="line">
-            <a:avLst/>
-          </a:prstGeom>
-        </p:spPr>
-        <p:style>
-          <a:lnRef idx="1">
-            <a:schemeClr val="dk1"/>
-          </a:lnRef>
-          <a:fillRef idx="0">
-            <a:schemeClr val="dk1"/>
-          </a:fillRef>
-          <a:effectRef idx="0">
-            <a:schemeClr val="dk1"/>
-          </a:effectRef>
-          <a:fontRef idx="minor">
-            <a:schemeClr val="tx1"/>
-          </a:fontRef>
-        </p:style>
-      </p:cxnSp>
-      <p:cxnSp>
-        <p:nvCxnSpPr>
-          <p:cNvPr id="57" name="Straight Connector 56"/>
-          <p:cNvCxnSpPr>
-            <a:endCxn id="22" idx="1"/>
-          </p:cNvCxnSpPr>
-          <p:nvPr/>
-        </p:nvCxnSpPr>
-        <p:spPr>
-          <a:xfrm>
-            <a:off x="5980060" y="2541989"/>
-            <a:ext cx="377200" cy="243659"/>
-          </a:xfrm>
-          <a:prstGeom prst="line">
-            <a:avLst/>
-          </a:prstGeom>
-        </p:spPr>
-        <p:style>
-          <a:lnRef idx="1">
-            <a:schemeClr val="dk1"/>
-          </a:lnRef>
-          <a:fillRef idx="0">
-            <a:schemeClr val="dk1"/>
-          </a:fillRef>
-          <a:effectRef idx="0">
-            <a:schemeClr val="dk1"/>
-          </a:effectRef>
-          <a:fontRef idx="minor">
-            <a:schemeClr val="tx1"/>
-          </a:fontRef>
-        </p:style>
-      </p:cxnSp>
-      <p:cxnSp>
-        <p:nvCxnSpPr>
-          <p:cNvPr id="61" name="Straight Connector 60"/>
-          <p:cNvCxnSpPr>
-            <a:stCxn id="23" idx="4"/>
-            <a:endCxn id="22" idx="7"/>
-          </p:cNvCxnSpPr>
-          <p:nvPr/>
-        </p:nvCxnSpPr>
-        <p:spPr>
-          <a:xfrm flipH="1">
-            <a:off x="7163794" y="2394388"/>
-            <a:ext cx="902403" cy="391260"/>
-          </a:xfrm>
-          <a:prstGeom prst="line">
-            <a:avLst/>
-          </a:prstGeom>
-          <a:ln w="12700">
-            <a:prstDash val="dash"/>
-            <a:tailEnd type="arrow" w="med" len="lg"/>
-          </a:ln>
-        </p:spPr>
-        <p:style>
-          <a:lnRef idx="2">
-            <a:schemeClr val="dk1"/>
-          </a:lnRef>
-          <a:fillRef idx="0">
-            <a:schemeClr val="dk1"/>
-          </a:fillRef>
-          <a:effectRef idx="1">
-            <a:schemeClr val="dk1"/>
-          </a:effectRef>
-          <a:fontRef idx="minor">
-            <a:schemeClr val="tx1"/>
-          </a:fontRef>
-        </p:style>
-      </p:cxnSp>
-      <p:cxnSp>
-        <p:nvCxnSpPr>
-          <p:cNvPr id="64" name="Straight Connector 63"/>
-          <p:cNvCxnSpPr>
-            <a:stCxn id="25" idx="0"/>
-            <a:endCxn id="22" idx="6"/>
-          </p:cNvCxnSpPr>
-          <p:nvPr/>
-        </p:nvCxnSpPr>
-        <p:spPr>
-          <a:xfrm flipH="1" flipV="1">
-            <a:off x="7330833" y="2898799"/>
-            <a:ext cx="741638" cy="526121"/>
-          </a:xfrm>
-          <a:prstGeom prst="line">
-            <a:avLst/>
-          </a:prstGeom>
-          <a:ln w="12700">
-            <a:prstDash val="dash"/>
-            <a:tailEnd type="arrow" w="med" len="lg"/>
-          </a:ln>
-        </p:spPr>
-        <p:style>
-          <a:lnRef idx="2">
-            <a:schemeClr val="dk1"/>
-          </a:lnRef>
-          <a:fillRef idx="0">
-            <a:schemeClr val="dk1"/>
-          </a:fillRef>
-          <a:effectRef idx="1">
-            <a:schemeClr val="dk1"/>
-          </a:effectRef>
-          <a:fontRef idx="minor">
-            <a:schemeClr val="tx1"/>
-          </a:fontRef>
-        </p:style>
-      </p:cxnSp>
-      <p:cxnSp>
-        <p:nvCxnSpPr>
-          <p:cNvPr id="68" name="Straight Connector 67"/>
-          <p:cNvCxnSpPr>
-            <a:stCxn id="24" idx="0"/>
-            <a:endCxn id="22" idx="4"/>
-          </p:cNvCxnSpPr>
-          <p:nvPr/>
-        </p:nvCxnSpPr>
-        <p:spPr>
-          <a:xfrm flipV="1">
-            <a:off x="6719546" y="3058819"/>
-            <a:ext cx="40981" cy="711783"/>
-          </a:xfrm>
-          <a:prstGeom prst="line">
-            <a:avLst/>
-          </a:prstGeom>
-          <a:ln w="12700">
-            <a:prstDash val="dash"/>
-            <a:tailEnd type="arrow" w="med" len="lg"/>
-          </a:ln>
-        </p:spPr>
-        <p:style>
-          <a:lnRef idx="2">
-            <a:schemeClr val="dk1"/>
-          </a:lnRef>
-          <a:fillRef idx="0">
-            <a:schemeClr val="dk1"/>
-          </a:fillRef>
-          <a:effectRef idx="1">
-            <a:schemeClr val="dk1"/>
-          </a:effectRef>
-          <a:fontRef idx="minor">
-            <a:schemeClr val="tx1"/>
-          </a:fontRef>
-        </p:style>
-      </p:cxnSp>
-      <p:cxnSp>
-        <p:nvCxnSpPr>
-          <p:cNvPr id="71" name="Straight Connector 70"/>
-          <p:cNvCxnSpPr>
-            <a:stCxn id="26" idx="1"/>
-            <a:endCxn id="22" idx="5"/>
-          </p:cNvCxnSpPr>
-          <p:nvPr/>
-        </p:nvCxnSpPr>
-        <p:spPr>
-          <a:xfrm flipH="1" flipV="1">
-            <a:off x="7163794" y="3011950"/>
-            <a:ext cx="416643" cy="1284589"/>
-          </a:xfrm>
-          <a:prstGeom prst="line">
-            <a:avLst/>
-          </a:prstGeom>
-          <a:ln w="12700">
-            <a:prstDash val="dash"/>
-            <a:tailEnd type="arrow" w="med" len="lg"/>
-          </a:ln>
-        </p:spPr>
-        <p:style>
-          <a:lnRef idx="2">
-            <a:schemeClr val="dk1"/>
-          </a:lnRef>
-          <a:fillRef idx="0">
-            <a:schemeClr val="dk1"/>
-          </a:fillRef>
-          <a:effectRef idx="1">
-            <a:schemeClr val="dk1"/>
-          </a:effectRef>
-          <a:fontRef idx="minor">
-            <a:schemeClr val="tx1"/>
-          </a:fontRef>
-        </p:style>
-      </p:cxnSp>
-      <p:sp>
-        <p:nvSpPr>
-          <p:cNvPr id="86" name="TextBox 85"/>
-          <p:cNvSpPr txBox="1"/>
-          <p:nvPr/>
-        </p:nvSpPr>
-        <p:spPr>
-          <a:xfrm>
-            <a:off x="5523009" y="3199337"/>
-            <a:ext cx="457051" cy="276999"/>
-          </a:xfrm>
-          <a:prstGeom prst="rect">
-            <a:avLst/>
-          </a:prstGeom>
-          <a:noFill/>
-        </p:spPr>
-        <p:txBody>
-          <a:bodyPr wrap="none" rtlCol="0">
-            <a:spAutoFit/>
-          </a:bodyPr>
-          <a:lstStyle/>
-          <a:p>
-            <a:r>
-              <a:rPr lang="en-US" sz="1200" dirty="0" smtClean="0"/>
-              <a:t>User</a:t>
-            </a:r>
-            <a:endParaRPr lang="en-US" sz="1200" dirty="0"/>
-          </a:p>
-        </p:txBody>
-      </p:sp>
-      <p:sp>
-        <p:nvSpPr>
-          <p:cNvPr id="87" name="TextBox 86"/>
-          <p:cNvSpPr txBox="1"/>
-          <p:nvPr/>
-        </p:nvSpPr>
-        <p:spPr>
-          <a:xfrm>
-            <a:off x="4881725" y="2295768"/>
-            <a:ext cx="537765" cy="246221"/>
-          </a:xfrm>
-          <a:prstGeom prst="rect">
-            <a:avLst/>
-          </a:prstGeom>
-          <a:noFill/>
-        </p:spPr>
-        <p:txBody>
-          <a:bodyPr wrap="none" rtlCol="0">
-            <a:spAutoFit/>
-          </a:bodyPr>
-          <a:lstStyle/>
-          <a:p>
-            <a:r>
-              <a:rPr lang="en-US" sz="1000" dirty="0" smtClean="0"/>
-              <a:t>Trainer</a:t>
-            </a:r>
-            <a:endParaRPr lang="en-US" sz="1000" dirty="0"/>
-          </a:p>
-        </p:txBody>
-      </p:sp>
-      <p:sp>
-        <p:nvSpPr>
-          <p:cNvPr id="88" name="TextBox 87"/>
-          <p:cNvSpPr txBox="1"/>
-          <p:nvPr/>
-        </p:nvSpPr>
-        <p:spPr>
-          <a:xfrm>
-            <a:off x="4824493" y="3689931"/>
-            <a:ext cx="676905" cy="246221"/>
-          </a:xfrm>
-          <a:prstGeom prst="rect">
-            <a:avLst/>
-          </a:prstGeom>
-          <a:noFill/>
-        </p:spPr>
-        <p:txBody>
-          <a:bodyPr wrap="square" rtlCol="0">
-            <a:spAutoFit/>
-          </a:bodyPr>
-          <a:lstStyle/>
-          <a:p>
-            <a:r>
-              <a:rPr lang="en-US" sz="1000" dirty="0" smtClean="0"/>
-              <a:t>Customer</a:t>
-            </a:r>
-            <a:endParaRPr lang="en-US" sz="1400" dirty="0"/>
-          </a:p>
-        </p:txBody>
-      </p:sp>
-      <p:sp>
-        <p:nvSpPr>
-          <p:cNvPr id="89" name="TextBox 88"/>
-          <p:cNvSpPr txBox="1"/>
-          <p:nvPr/>
-        </p:nvSpPr>
-        <p:spPr>
-          <a:xfrm>
-            <a:off x="7499736" y="2482524"/>
-            <a:ext cx="738554" cy="215444"/>
-          </a:xfrm>
-          <a:prstGeom prst="rect">
-            <a:avLst/>
-          </a:prstGeom>
-          <a:noFill/>
-        </p:spPr>
-        <p:txBody>
-          <a:bodyPr wrap="none" rtlCol="0">
-            <a:spAutoFit/>
-          </a:bodyPr>
-          <a:lstStyle/>
-          <a:p>
-            <a:r>
-              <a:rPr lang="en-US" sz="800" dirty="0" smtClean="0"/>
-              <a:t>&lt;&lt;extend&gt;&gt;</a:t>
-            </a:r>
-            <a:endParaRPr lang="en-US" sz="800" dirty="0"/>
-          </a:p>
-        </p:txBody>
-      </p:sp>
-      <p:sp>
-        <p:nvSpPr>
-          <p:cNvPr id="90" name="TextBox 89"/>
-          <p:cNvSpPr txBox="1"/>
-          <p:nvPr/>
-        </p:nvSpPr>
-        <p:spPr>
-          <a:xfrm>
-            <a:off x="7655804" y="3052160"/>
-            <a:ext cx="738554" cy="215444"/>
-          </a:xfrm>
-          <a:prstGeom prst="rect">
-            <a:avLst/>
-          </a:prstGeom>
-          <a:noFill/>
-        </p:spPr>
-        <p:txBody>
-          <a:bodyPr wrap="none" rtlCol="0">
-            <a:spAutoFit/>
-          </a:bodyPr>
-          <a:lstStyle/>
-          <a:p>
-            <a:r>
-              <a:rPr lang="en-US" sz="800" dirty="0" smtClean="0"/>
-              <a:t>&lt;&lt;extend&gt;&gt;</a:t>
-            </a:r>
-            <a:endParaRPr lang="en-US" sz="800" dirty="0"/>
-          </a:p>
-        </p:txBody>
-      </p:sp>
-      <p:sp>
-        <p:nvSpPr>
-          <p:cNvPr id="91" name="TextBox 90"/>
-          <p:cNvSpPr txBox="1"/>
-          <p:nvPr/>
-        </p:nvSpPr>
-        <p:spPr>
-          <a:xfrm>
-            <a:off x="6723080" y="3474486"/>
-            <a:ext cx="738554" cy="215444"/>
-          </a:xfrm>
-          <a:prstGeom prst="rect">
-            <a:avLst/>
-          </a:prstGeom>
-          <a:noFill/>
-        </p:spPr>
-        <p:txBody>
-          <a:bodyPr wrap="none" rtlCol="0">
-            <a:spAutoFit/>
-          </a:bodyPr>
-          <a:lstStyle/>
-          <a:p>
-            <a:r>
-              <a:rPr lang="en-US" sz="800" dirty="0" smtClean="0"/>
-              <a:t>&lt;&lt;extend&gt;&gt;</a:t>
-            </a:r>
-            <a:endParaRPr lang="en-US" sz="800" dirty="0"/>
-          </a:p>
-        </p:txBody>
-      </p:sp>
-      <p:sp>
-        <p:nvSpPr>
-          <p:cNvPr id="92" name="TextBox 91"/>
-          <p:cNvSpPr txBox="1"/>
-          <p:nvPr/>
-        </p:nvSpPr>
-        <p:spPr>
-          <a:xfrm>
-            <a:off x="6092125" y="3293468"/>
-            <a:ext cx="738554" cy="215444"/>
-          </a:xfrm>
-          <a:prstGeom prst="rect">
-            <a:avLst/>
-          </a:prstGeom>
-          <a:noFill/>
-        </p:spPr>
-        <p:txBody>
-          <a:bodyPr wrap="none" rtlCol="0">
-            <a:spAutoFit/>
-          </a:bodyPr>
-          <a:lstStyle/>
-          <a:p>
-            <a:r>
-              <a:rPr lang="en-US" sz="800" dirty="0" smtClean="0"/>
-              <a:t>&lt;&lt;extend&gt;&gt;</a:t>
-            </a:r>
-            <a:endParaRPr lang="en-US" sz="1100" dirty="0"/>
-          </a:p>
-        </p:txBody>
-      </p:sp>
-      <p:sp>
-        <p:nvSpPr>
-          <p:cNvPr id="111" name="Right Triangle 110"/>
-          <p:cNvSpPr/>
-          <p:nvPr/>
-        </p:nvSpPr>
-        <p:spPr>
-          <a:xfrm rot="16200000">
-            <a:off x="5501398" y="2364203"/>
-            <a:ext cx="91440" cy="91440"/>
-          </a:xfrm>
-          <a:prstGeom prst="rtTriangle">
-            <a:avLst/>
-          </a:prstGeom>
-          <a:noFill/>
         </p:spPr>
         <p:style>
           <a:lnRef idx="2">
@@ -14752,141 +13864,7 @@
             <a:schemeClr val="dk1"/>
           </a:fontRef>
         </p:style>
-        <p:txBody>
-          <a:bodyPr rtlCol="0" anchor="ctr"/>
-          <a:lstStyle/>
-          <a:p>
-            <a:pPr algn="ctr"/>
-            <a:endParaRPr lang="en-US"/>
-          </a:p>
-        </p:txBody>
-      </p:sp>
-      <p:cxnSp>
-        <p:nvCxnSpPr>
-          <p:cNvPr id="112" name="Straight Connector 111"/>
-          <p:cNvCxnSpPr/>
-          <p:nvPr/>
-        </p:nvCxnSpPr>
-        <p:spPr>
-          <a:xfrm flipH="1" flipV="1">
-            <a:off x="5220943" y="2074349"/>
-            <a:ext cx="326177" cy="335575"/>
-          </a:xfrm>
-          <a:prstGeom prst="line">
-            <a:avLst/>
-          </a:prstGeom>
-          <a:ln w="12700">
-            <a:solidFill>
-              <a:schemeClr val="tx1"/>
-            </a:solidFill>
-          </a:ln>
-          <a:effectLst/>
-        </p:spPr>
-        <p:style>
-          <a:lnRef idx="2">
-            <a:schemeClr val="dk1"/>
-          </a:lnRef>
-          <a:fillRef idx="0">
-            <a:schemeClr val="dk1"/>
-          </a:fillRef>
-          <a:effectRef idx="1">
-            <a:schemeClr val="dk1"/>
-          </a:effectRef>
-          <a:fontRef idx="minor">
-            <a:schemeClr val="tx1"/>
-          </a:fontRef>
-        </p:style>
-      </p:cxnSp>
-      <p:grpSp>
-        <p:nvGrpSpPr>
-          <p:cNvPr id="114" name="Group 113"/>
-          <p:cNvGrpSpPr/>
-          <p:nvPr/>
-        </p:nvGrpSpPr>
-        <p:grpSpPr>
-          <a:xfrm rot="19115975">
-            <a:off x="5046353" y="3066656"/>
-            <a:ext cx="699237" cy="91440"/>
-            <a:chOff x="4915212" y="2515207"/>
-            <a:chExt cx="699237" cy="91440"/>
-          </a:xfrm>
-        </p:grpSpPr>
-        <p:sp>
-          <p:nvSpPr>
-            <p:cNvPr id="115" name="Right Triangle 114"/>
-            <p:cNvSpPr/>
-            <p:nvPr/>
-          </p:nvSpPr>
-          <p:spPr>
-            <a:xfrm rot="13500000">
-              <a:off x="5523009" y="2515207"/>
-              <a:ext cx="91440" cy="91440"/>
-            </a:xfrm>
-            <a:prstGeom prst="rtTriangle">
-              <a:avLst/>
-            </a:prstGeom>
-            <a:noFill/>
-          </p:spPr>
-          <p:style>
-            <a:lnRef idx="2">
-              <a:schemeClr val="dk1"/>
-            </a:lnRef>
-            <a:fillRef idx="1">
-              <a:schemeClr val="lt1"/>
-            </a:fillRef>
-            <a:effectRef idx="0">
-              <a:schemeClr val="dk1"/>
-            </a:effectRef>
-            <a:fontRef idx="minor">
-              <a:schemeClr val="dk1"/>
-            </a:fontRef>
-          </p:style>
-          <p:txBody>
-            <a:bodyPr rtlCol="0" anchor="ctr"/>
-            <a:lstStyle/>
-            <a:p>
-              <a:pPr algn="ctr"/>
-              <a:endParaRPr lang="en-US"/>
-            </a:p>
-          </p:txBody>
-        </p:sp>
-        <p:cxnSp>
-          <p:nvCxnSpPr>
-            <p:cNvPr id="116" name="Straight Connector 115"/>
-            <p:cNvCxnSpPr/>
-            <p:nvPr/>
-          </p:nvCxnSpPr>
-          <p:spPr>
-            <a:xfrm flipH="1">
-              <a:off x="4915212" y="2560927"/>
-              <a:ext cx="653517" cy="0"/>
-            </a:xfrm>
-            <a:prstGeom prst="line">
-              <a:avLst/>
-            </a:prstGeom>
-            <a:ln w="12700">
-              <a:solidFill>
-                <a:schemeClr val="tx1"/>
-              </a:solidFill>
-            </a:ln>
-            <a:effectLst/>
-          </p:spPr>
-          <p:style>
-            <a:lnRef idx="2">
-              <a:schemeClr val="dk1"/>
-            </a:lnRef>
-            <a:fillRef idx="0">
-              <a:schemeClr val="dk1"/>
-            </a:fillRef>
-            <a:effectRef idx="1">
-              <a:schemeClr val="dk1"/>
-            </a:effectRef>
-            <a:fontRef idx="minor">
-              <a:schemeClr val="tx1"/>
-            </a:fontRef>
-          </p:style>
-        </p:cxnSp>
-      </p:grpSp>
+      </p:pic>
     </p:spTree>
     <p:extLst>
       <p:ext uri="{BB962C8B-B14F-4D97-AF65-F5344CB8AC3E}">
@@ -14924,6 +13902,50 @@
           <a:chExt cx="0" cy="0"/>
         </a:xfrm>
       </p:grpSpPr>
+      <p:pic>
+        <p:nvPicPr>
+          <p:cNvPr id="7" name="Content Placeholder 6" descr="EnterBodyMeasurements.png"/>
+          <p:cNvPicPr>
+            <a:picLocks noGrp="1" noChangeAspect="1"/>
+          </p:cNvPicPr>
+          <p:nvPr>
+            <p:ph sz="quarter" idx="2"/>
+          </p:nvPr>
+        </p:nvPicPr>
+        <p:blipFill>
+          <a:blip r:embed="rId2">
+            <a:extLst>
+              <a:ext uri="{28A0092B-C50C-407E-A947-70E740481C1C}">
+                <a14:useLocalDpi xmlns:a14="http://schemas.microsoft.com/office/drawing/2010/main" val="0"/>
+              </a:ext>
+            </a:extLst>
+          </a:blip>
+          <a:srcRect l="256" r="256"/>
+          <a:stretch>
+            <a:fillRect/>
+          </a:stretch>
+        </p:blipFill>
+        <p:spPr>
+          <a:xfrm>
+            <a:off x="4845050" y="1192213"/>
+            <a:ext cx="3886200" cy="3246437"/>
+          </a:xfrm>
+        </p:spPr>
+        <p:style>
+          <a:lnRef idx="2">
+            <a:schemeClr val="dk1"/>
+          </a:lnRef>
+          <a:fillRef idx="1">
+            <a:schemeClr val="lt1"/>
+          </a:fillRef>
+          <a:effectRef idx="0">
+            <a:schemeClr val="dk1"/>
+          </a:effectRef>
+          <a:fontRef idx="minor">
+            <a:schemeClr val="dk1"/>
+          </a:fontRef>
+        </p:style>
+      </p:pic>
       <p:sp>
         <p:nvSpPr>
           <p:cNvPr id="2" name="Title 1"/>
@@ -14943,57 +13965,9 @@
           <a:p>
             <a:r>
               <a:rPr lang="en-US" dirty="0" smtClean="0"/>
-              <a:t>Enter </a:t>
-            </a:r>
-            <a:r>
-              <a:rPr lang="en-US" dirty="0" smtClean="0"/>
-              <a:t>Measurements Use Case</a:t>
+              <a:t>Enter Measurements Use Case</a:t>
             </a:r>
             <a:endParaRPr lang="en-US" dirty="0"/>
-          </a:p>
-        </p:txBody>
-      </p:sp>
-      <p:sp>
-        <p:nvSpPr>
-          <p:cNvPr id="5" name="Content Placeholder 4"/>
-          <p:cNvSpPr>
-            <a:spLocks noGrp="1"/>
-          </p:cNvSpPr>
-          <p:nvPr>
-            <p:ph sz="quarter" idx="2"/>
-          </p:nvPr>
-        </p:nvSpPr>
-        <p:spPr>
-          <a:xfrm>
-            <a:off x="4747197" y="1188720"/>
-            <a:ext cx="3886200" cy="3246158"/>
-          </a:xfrm>
-        </p:spPr>
-        <p:style>
-          <a:lnRef idx="2">
-            <a:schemeClr val="dk1"/>
-          </a:lnRef>
-          <a:fillRef idx="1">
-            <a:schemeClr val="lt1"/>
-          </a:fillRef>
-          <a:effectRef idx="0">
-            <a:schemeClr val="dk1"/>
-          </a:effectRef>
-          <a:fontRef idx="minor">
-            <a:schemeClr val="dk1"/>
-          </a:fontRef>
-        </p:style>
-        <p:txBody>
-          <a:bodyPr/>
-          <a:lstStyle/>
-          <a:p>
-            <a:pPr marL="0" indent="0">
-              <a:buNone/>
-            </a:pPr>
-            <a:r>
-              <a:rPr lang="en-US" dirty="0"/>
-              <a:t> </a:t>
-            </a:r>
           </a:p>
         </p:txBody>
       </p:sp>
@@ -15008,7 +13982,7 @@
           </p:nvPr>
         </p:nvPicPr>
         <p:blipFill rotWithShape="1">
-          <a:blip r:embed="rId2"/>
+          <a:blip r:embed="rId3"/>
           <a:srcRect t="583" b="5445"/>
           <a:stretch/>
         </p:blipFill>
@@ -15036,551 +14010,6 @@
           </a:fontRef>
         </p:style>
       </p:pic>
-      <p:sp>
-        <p:nvSpPr>
-          <p:cNvPr id="11" name="Rectangle 10"/>
-          <p:cNvSpPr/>
-          <p:nvPr/>
-        </p:nvSpPr>
-        <p:spPr>
-          <a:xfrm>
-            <a:off x="5974646" y="1359526"/>
-            <a:ext cx="2569497" cy="2894755"/>
-          </a:xfrm>
-          <a:prstGeom prst="rect">
-            <a:avLst/>
-          </a:prstGeom>
-        </p:spPr>
-        <p:style>
-          <a:lnRef idx="1">
-            <a:schemeClr val="accent1"/>
-          </a:lnRef>
-          <a:fillRef idx="2">
-            <a:schemeClr val="accent1"/>
-          </a:fillRef>
-          <a:effectRef idx="1">
-            <a:schemeClr val="accent1"/>
-          </a:effectRef>
-          <a:fontRef idx="minor">
-            <a:schemeClr val="dk1"/>
-          </a:fontRef>
-        </p:style>
-        <p:txBody>
-          <a:bodyPr rtlCol="0" anchor="ctr"/>
-          <a:lstStyle/>
-          <a:p>
-            <a:pPr algn="ctr"/>
-            <a:r>
-              <a:rPr lang="en-US" dirty="0" smtClean="0"/>
-              <a:t>Ente</a:t>
-            </a:r>
-            <a:r>
-              <a:rPr lang="en-US" dirty="0" smtClean="0"/>
-              <a:t>r Body Measurements</a:t>
-            </a:r>
-            <a:endParaRPr lang="en-US" dirty="0" smtClean="0"/>
-          </a:p>
-          <a:p>
-            <a:pPr algn="ctr"/>
-            <a:endParaRPr lang="en-US" dirty="0"/>
-          </a:p>
-          <a:p>
-            <a:pPr algn="ctr"/>
-            <a:endParaRPr lang="en-US" dirty="0" smtClean="0"/>
-          </a:p>
-          <a:p>
-            <a:pPr algn="ctr"/>
-            <a:endParaRPr lang="en-US" dirty="0"/>
-          </a:p>
-          <a:p>
-            <a:pPr algn="ctr"/>
-            <a:endParaRPr lang="en-US" dirty="0" smtClean="0"/>
-          </a:p>
-          <a:p>
-            <a:pPr algn="ctr"/>
-            <a:endParaRPr lang="en-US" dirty="0"/>
-          </a:p>
-          <a:p>
-            <a:pPr algn="ctr"/>
-            <a:endParaRPr lang="en-US" dirty="0" smtClean="0"/>
-          </a:p>
-          <a:p>
-            <a:pPr algn="ctr"/>
-            <a:endParaRPr lang="en-US" dirty="0"/>
-          </a:p>
-          <a:p>
-            <a:pPr algn="ctr"/>
-            <a:endParaRPr lang="en-US" sz="1200" dirty="0" smtClean="0"/>
-          </a:p>
-          <a:p>
-            <a:pPr algn="ctr"/>
-            <a:endParaRPr lang="en-US" sz="1200" dirty="0"/>
-          </a:p>
-          <a:p>
-            <a:pPr algn="ctr"/>
-            <a:endParaRPr lang="en-US" sz="1200" dirty="0"/>
-          </a:p>
-        </p:txBody>
-      </p:sp>
-      <p:sp>
-        <p:nvSpPr>
-          <p:cNvPr id="13" name="Oval 12"/>
-          <p:cNvSpPr/>
-          <p:nvPr/>
-        </p:nvSpPr>
-        <p:spPr>
-          <a:xfrm>
-            <a:off x="6097861" y="2484789"/>
-            <a:ext cx="1140612" cy="320040"/>
-          </a:xfrm>
-          <a:prstGeom prst="ellipse">
-            <a:avLst/>
-          </a:prstGeom>
-        </p:spPr>
-        <p:style>
-          <a:lnRef idx="1">
-            <a:schemeClr val="accent4"/>
-          </a:lnRef>
-          <a:fillRef idx="2">
-            <a:schemeClr val="accent4"/>
-          </a:fillRef>
-          <a:effectRef idx="1">
-            <a:schemeClr val="accent4"/>
-          </a:effectRef>
-          <a:fontRef idx="minor">
-            <a:schemeClr val="dk1"/>
-          </a:fontRef>
-        </p:style>
-        <p:txBody>
-          <a:bodyPr lIns="0" rIns="0" rtlCol="0" anchor="ctr"/>
-          <a:lstStyle/>
-          <a:p>
-            <a:pPr algn="ctr"/>
-            <a:r>
-              <a:rPr lang="en-US" sz="1000" dirty="0" smtClean="0"/>
-              <a:t>Enter Measurements</a:t>
-            </a:r>
-            <a:endParaRPr lang="en-US" sz="1000" dirty="0"/>
-          </a:p>
-        </p:txBody>
-      </p:sp>
-      <p:sp>
-        <p:nvSpPr>
-          <p:cNvPr id="14" name="Oval 13"/>
-          <p:cNvSpPr/>
-          <p:nvPr/>
-        </p:nvSpPr>
-        <p:spPr>
-          <a:xfrm>
-            <a:off x="7403531" y="1889628"/>
-            <a:ext cx="1140612" cy="320040"/>
-          </a:xfrm>
-          <a:prstGeom prst="ellipse">
-            <a:avLst/>
-          </a:prstGeom>
-        </p:spPr>
-        <p:style>
-          <a:lnRef idx="1">
-            <a:schemeClr val="accent4"/>
-          </a:lnRef>
-          <a:fillRef idx="2">
-            <a:schemeClr val="accent4"/>
-          </a:fillRef>
-          <a:effectRef idx="1">
-            <a:schemeClr val="accent4"/>
-          </a:effectRef>
-          <a:fontRef idx="minor">
-            <a:schemeClr val="dk1"/>
-          </a:fontRef>
-        </p:style>
-        <p:txBody>
-          <a:bodyPr lIns="0" rIns="0" rtlCol="0" anchor="ctr"/>
-          <a:lstStyle/>
-          <a:p>
-            <a:pPr algn="ctr"/>
-            <a:r>
-              <a:rPr lang="en-US" sz="1000" dirty="0" smtClean="0"/>
-              <a:t>Login</a:t>
-            </a:r>
-            <a:endParaRPr lang="en-US" sz="1000" dirty="0"/>
-          </a:p>
-        </p:txBody>
-      </p:sp>
-      <p:pic>
-        <p:nvPicPr>
-          <p:cNvPr id="20" name="Picture 19" descr="UML_Actor.png"/>
-          <p:cNvPicPr>
-            <a:picLocks noChangeAspect="1"/>
-          </p:cNvPicPr>
-          <p:nvPr/>
-        </p:nvPicPr>
-        <p:blipFill>
-          <a:blip r:embed="rId3">
-            <a:extLst>
-              <a:ext uri="{28A0092B-C50C-407E-A947-70E740481C1C}">
-                <a14:useLocalDpi xmlns:a14="http://schemas.microsoft.com/office/drawing/2010/main" val="0"/>
-              </a:ext>
-            </a:extLst>
-          </a:blip>
-          <a:stretch>
-            <a:fillRect/>
-          </a:stretch>
-        </p:blipFill>
-        <p:spPr>
-          <a:xfrm>
-            <a:off x="4984773" y="2025437"/>
-            <a:ext cx="506085" cy="826343"/>
-          </a:xfrm>
-          <a:prstGeom prst="rect">
-            <a:avLst/>
-          </a:prstGeom>
-        </p:spPr>
-      </p:pic>
-      <p:cxnSp>
-        <p:nvCxnSpPr>
-          <p:cNvPr id="22" name="Straight Connector 21"/>
-          <p:cNvCxnSpPr>
-            <a:endCxn id="13" idx="2"/>
-          </p:cNvCxnSpPr>
-          <p:nvPr/>
-        </p:nvCxnSpPr>
-        <p:spPr>
-          <a:xfrm>
-            <a:off x="5380185" y="2531658"/>
-            <a:ext cx="717676" cy="113151"/>
-          </a:xfrm>
-          <a:prstGeom prst="line">
-            <a:avLst/>
-          </a:prstGeom>
-        </p:spPr>
-        <p:style>
-          <a:lnRef idx="1">
-            <a:schemeClr val="dk1"/>
-          </a:lnRef>
-          <a:fillRef idx="0">
-            <a:schemeClr val="dk1"/>
-          </a:fillRef>
-          <a:effectRef idx="0">
-            <a:schemeClr val="dk1"/>
-          </a:effectRef>
-          <a:fontRef idx="minor">
-            <a:schemeClr val="tx1"/>
-          </a:fontRef>
-        </p:style>
-      </p:cxnSp>
-      <p:cxnSp>
-        <p:nvCxnSpPr>
-          <p:cNvPr id="23" name="Straight Connector 22"/>
-          <p:cNvCxnSpPr>
-            <a:stCxn id="14" idx="3"/>
-            <a:endCxn id="13" idx="7"/>
-          </p:cNvCxnSpPr>
-          <p:nvPr/>
-        </p:nvCxnSpPr>
-        <p:spPr>
-          <a:xfrm flipH="1">
-            <a:off x="7071434" y="2162799"/>
-            <a:ext cx="499136" cy="368859"/>
-          </a:xfrm>
-          <a:prstGeom prst="line">
-            <a:avLst/>
-          </a:prstGeom>
-          <a:ln w="12700">
-            <a:prstDash val="dash"/>
-            <a:tailEnd type="arrow" w="med" len="lg"/>
-          </a:ln>
-        </p:spPr>
-        <p:style>
-          <a:lnRef idx="2">
-            <a:schemeClr val="dk1"/>
-          </a:lnRef>
-          <a:fillRef idx="0">
-            <a:schemeClr val="dk1"/>
-          </a:fillRef>
-          <a:effectRef idx="1">
-            <a:schemeClr val="dk1"/>
-          </a:effectRef>
-          <a:fontRef idx="minor">
-            <a:schemeClr val="tx1"/>
-          </a:fontRef>
-        </p:style>
-      </p:cxnSp>
-      <p:cxnSp>
-        <p:nvCxnSpPr>
-          <p:cNvPr id="24" name="Straight Connector 23"/>
-          <p:cNvCxnSpPr>
-            <a:stCxn id="52" idx="0"/>
-            <a:endCxn id="13" idx="5"/>
-          </p:cNvCxnSpPr>
-          <p:nvPr/>
-        </p:nvCxnSpPr>
-        <p:spPr>
-          <a:xfrm flipH="1" flipV="1">
-            <a:off x="7071434" y="2757960"/>
-            <a:ext cx="655885" cy="845371"/>
-          </a:xfrm>
-          <a:prstGeom prst="line">
-            <a:avLst/>
-          </a:prstGeom>
-          <a:ln w="12700">
-            <a:prstDash val="dash"/>
-            <a:tailEnd type="arrow" w="med" len="lg"/>
-          </a:ln>
-        </p:spPr>
-        <p:style>
-          <a:lnRef idx="2">
-            <a:schemeClr val="dk1"/>
-          </a:lnRef>
-          <a:fillRef idx="0">
-            <a:schemeClr val="dk1"/>
-          </a:fillRef>
-          <a:effectRef idx="1">
-            <a:schemeClr val="dk1"/>
-          </a:effectRef>
-          <a:fontRef idx="minor">
-            <a:schemeClr val="tx1"/>
-          </a:fontRef>
-        </p:style>
-      </p:cxnSp>
-      <p:sp>
-        <p:nvSpPr>
-          <p:cNvPr id="27" name="TextBox 26"/>
-          <p:cNvSpPr txBox="1"/>
-          <p:nvPr/>
-        </p:nvSpPr>
-        <p:spPr>
-          <a:xfrm>
-            <a:off x="4864944" y="2749082"/>
-            <a:ext cx="745742" cy="276999"/>
-          </a:xfrm>
-          <a:prstGeom prst="rect">
-            <a:avLst/>
-          </a:prstGeom>
-          <a:noFill/>
-        </p:spPr>
-        <p:txBody>
-          <a:bodyPr wrap="none" rtlCol="0">
-            <a:spAutoFit/>
-          </a:bodyPr>
-          <a:lstStyle/>
-          <a:p>
-            <a:r>
-              <a:rPr lang="en-US" sz="1200" dirty="0" smtClean="0"/>
-              <a:t>Customer</a:t>
-            </a:r>
-            <a:endParaRPr lang="en-US" sz="1200" dirty="0"/>
-          </a:p>
-        </p:txBody>
-      </p:sp>
-      <p:sp>
-        <p:nvSpPr>
-          <p:cNvPr id="29" name="TextBox 28"/>
-          <p:cNvSpPr txBox="1"/>
-          <p:nvPr/>
-        </p:nvSpPr>
-        <p:spPr>
-          <a:xfrm>
-            <a:off x="7257291" y="2286259"/>
-            <a:ext cx="740607" cy="215444"/>
-          </a:xfrm>
-          <a:prstGeom prst="rect">
-            <a:avLst/>
-          </a:prstGeom>
-          <a:noFill/>
-        </p:spPr>
-        <p:txBody>
-          <a:bodyPr wrap="none" rtlCol="0">
-            <a:spAutoFit/>
-          </a:bodyPr>
-          <a:lstStyle/>
-          <a:p>
-            <a:r>
-              <a:rPr lang="en-US" sz="800" dirty="0" smtClean="0"/>
-              <a:t>&lt;</a:t>
-            </a:r>
-            <a:r>
-              <a:rPr lang="en-US" sz="800" dirty="0" smtClean="0"/>
-              <a:t>&lt;include&gt;</a:t>
-            </a:r>
-            <a:r>
-              <a:rPr lang="en-US" sz="800" dirty="0" smtClean="0"/>
-              <a:t>&gt;</a:t>
-            </a:r>
-            <a:endParaRPr lang="en-US" sz="800" dirty="0"/>
-          </a:p>
-        </p:txBody>
-      </p:sp>
-      <p:sp>
-        <p:nvSpPr>
-          <p:cNvPr id="30" name="TextBox 29"/>
-          <p:cNvSpPr txBox="1"/>
-          <p:nvPr/>
-        </p:nvSpPr>
-        <p:spPr>
-          <a:xfrm>
-            <a:off x="6730023" y="2962404"/>
-            <a:ext cx="738554" cy="215444"/>
-          </a:xfrm>
-          <a:prstGeom prst="rect">
-            <a:avLst/>
-          </a:prstGeom>
-          <a:noFill/>
-        </p:spPr>
-        <p:txBody>
-          <a:bodyPr wrap="none" rtlCol="0">
-            <a:spAutoFit/>
-          </a:bodyPr>
-          <a:lstStyle/>
-          <a:p>
-            <a:r>
-              <a:rPr lang="en-US" sz="800" dirty="0" smtClean="0"/>
-              <a:t>&lt;&lt;extend&gt;&gt;</a:t>
-            </a:r>
-            <a:endParaRPr lang="en-US" sz="800" dirty="0"/>
-          </a:p>
-        </p:txBody>
-      </p:sp>
-      <p:sp>
-        <p:nvSpPr>
-          <p:cNvPr id="52" name="Oval 51"/>
-          <p:cNvSpPr/>
-          <p:nvPr/>
-        </p:nvSpPr>
-        <p:spPr>
-          <a:xfrm>
-            <a:off x="7157013" y="3603331"/>
-            <a:ext cx="1140612" cy="523239"/>
-          </a:xfrm>
-          <a:prstGeom prst="ellipse">
-            <a:avLst/>
-          </a:prstGeom>
-        </p:spPr>
-        <p:style>
-          <a:lnRef idx="1">
-            <a:schemeClr val="accent4"/>
-          </a:lnRef>
-          <a:fillRef idx="2">
-            <a:schemeClr val="accent4"/>
-          </a:fillRef>
-          <a:effectRef idx="1">
-            <a:schemeClr val="accent4"/>
-          </a:effectRef>
-          <a:fontRef idx="minor">
-            <a:schemeClr val="dk1"/>
-          </a:fontRef>
-        </p:style>
-        <p:txBody>
-          <a:bodyPr lIns="0" tIns="0" rIns="0" bIns="0" rtlCol="0" anchor="ctr"/>
-          <a:lstStyle/>
-          <a:p>
-            <a:pPr algn="ctr"/>
-            <a:r>
-              <a:rPr lang="en-US" sz="1000" dirty="0" smtClean="0"/>
-              <a:t>Personal Trainer Updates Measurements</a:t>
-            </a:r>
-            <a:endParaRPr lang="en-US" sz="1000" dirty="0"/>
-          </a:p>
-        </p:txBody>
-      </p:sp>
-      <p:pic>
-        <p:nvPicPr>
-          <p:cNvPr id="57" name="Picture 56" descr="UML_Actor.png"/>
-          <p:cNvPicPr>
-            <a:picLocks noChangeAspect="1"/>
-          </p:cNvPicPr>
-          <p:nvPr/>
-        </p:nvPicPr>
-        <p:blipFill>
-          <a:blip r:embed="rId3">
-            <a:extLst>
-              <a:ext uri="{28A0092B-C50C-407E-A947-70E740481C1C}">
-                <a14:useLocalDpi xmlns:a14="http://schemas.microsoft.com/office/drawing/2010/main" val="0"/>
-              </a:ext>
-            </a:extLst>
-          </a:blip>
-          <a:stretch>
-            <a:fillRect/>
-          </a:stretch>
-        </p:blipFill>
-        <p:spPr>
-          <a:xfrm>
-            <a:off x="5137176" y="3151750"/>
-            <a:ext cx="506085" cy="826343"/>
-          </a:xfrm>
-          <a:prstGeom prst="rect">
-            <a:avLst/>
-          </a:prstGeom>
-        </p:spPr>
-      </p:pic>
-      <p:sp>
-        <p:nvSpPr>
-          <p:cNvPr id="58" name="TextBox 57"/>
-          <p:cNvSpPr txBox="1"/>
-          <p:nvPr/>
-        </p:nvSpPr>
-        <p:spPr>
-          <a:xfrm>
-            <a:off x="5017347" y="3990190"/>
-            <a:ext cx="694797" cy="461665"/>
-          </a:xfrm>
-          <a:prstGeom prst="rect">
-            <a:avLst/>
-          </a:prstGeom>
-          <a:noFill/>
-        </p:spPr>
-        <p:txBody>
-          <a:bodyPr wrap="none" rtlCol="0">
-            <a:spAutoFit/>
-          </a:bodyPr>
-          <a:lstStyle/>
-          <a:p>
-            <a:pPr algn="ctr"/>
-            <a:r>
-              <a:rPr lang="en-US" sz="1200" dirty="0" smtClean="0"/>
-              <a:t>Personal </a:t>
-            </a:r>
-          </a:p>
-          <a:p>
-            <a:r>
-              <a:rPr lang="en-US" sz="1200" dirty="0" smtClean="0"/>
-              <a:t>Trainer</a:t>
-            </a:r>
-            <a:endParaRPr lang="en-US" sz="1200" dirty="0"/>
-          </a:p>
-        </p:txBody>
-      </p:sp>
-      <p:cxnSp>
-        <p:nvCxnSpPr>
-          <p:cNvPr id="60" name="Straight Connector 59"/>
-          <p:cNvCxnSpPr>
-            <a:endCxn id="52" idx="2"/>
-          </p:cNvCxnSpPr>
-          <p:nvPr/>
-        </p:nvCxnSpPr>
-        <p:spPr>
-          <a:xfrm>
-            <a:off x="5610686" y="3694549"/>
-            <a:ext cx="1546327" cy="170402"/>
-          </a:xfrm>
-          <a:prstGeom prst="line">
-            <a:avLst/>
-          </a:prstGeom>
-        </p:spPr>
-        <p:style>
-          <a:lnRef idx="1">
-            <a:schemeClr val="dk1"/>
-          </a:lnRef>
-          <a:fillRef idx="0">
-            <a:schemeClr val="dk1"/>
-          </a:fillRef>
-          <a:effectRef idx="0">
-            <a:schemeClr val="dk1"/>
-          </a:effectRef>
-          <a:fontRef idx="minor">
-            <a:schemeClr val="tx1"/>
-          </a:fontRef>
-        </p:style>
-      </p:cxnSp>
     </p:spTree>
     <p:extLst>
       <p:ext uri="{BB962C8B-B14F-4D97-AF65-F5344CB8AC3E}">
@@ -15667,11 +14096,7 @@
           <a:p>
             <a:r>
               <a:rPr lang="en-US" dirty="0" smtClean="0"/>
-              <a:t>Design </a:t>
-            </a:r>
-            <a:r>
-              <a:rPr lang="en-US" dirty="0" smtClean="0"/>
-              <a:t>a Workout Use Case</a:t>
+              <a:t>Design a Workout Use Case</a:t>
             </a:r>
             <a:endParaRPr lang="en-US" dirty="0"/>
           </a:p>
@@ -16024,57 +14449,9 @@
           <a:p>
             <a:r>
               <a:rPr lang="en-US" dirty="0" smtClean="0"/>
-              <a:t>Record </a:t>
-            </a:r>
-            <a:r>
-              <a:rPr lang="en-US" dirty="0" smtClean="0"/>
-              <a:t>Food Intake Use Case</a:t>
+              <a:t>Record Food Intake Use Case</a:t>
             </a:r>
             <a:endParaRPr lang="en-US" dirty="0"/>
-          </a:p>
-        </p:txBody>
-      </p:sp>
-      <p:sp>
-        <p:nvSpPr>
-          <p:cNvPr id="5" name="Content Placeholder 4"/>
-          <p:cNvSpPr>
-            <a:spLocks noGrp="1"/>
-          </p:cNvSpPr>
-          <p:nvPr>
-            <p:ph sz="quarter" idx="2"/>
-          </p:nvPr>
-        </p:nvSpPr>
-        <p:spPr>
-          <a:xfrm>
-            <a:off x="4844901" y="1192175"/>
-            <a:ext cx="3886200" cy="3026664"/>
-          </a:xfrm>
-        </p:spPr>
-        <p:style>
-          <a:lnRef idx="2">
-            <a:schemeClr val="dk1"/>
-          </a:lnRef>
-          <a:fillRef idx="1">
-            <a:schemeClr val="lt1"/>
-          </a:fillRef>
-          <a:effectRef idx="0">
-            <a:schemeClr val="dk1"/>
-          </a:effectRef>
-          <a:fontRef idx="minor">
-            <a:schemeClr val="dk1"/>
-          </a:fontRef>
-        </p:style>
-        <p:txBody>
-          <a:bodyPr/>
-          <a:lstStyle/>
-          <a:p>
-            <a:pPr marL="0" indent="0">
-              <a:buNone/>
-            </a:pPr>
-            <a:r>
-              <a:rPr lang="en-US" dirty="0"/>
-              <a:t> </a:t>
-            </a:r>
           </a:p>
         </p:txBody>
       </p:sp>
@@ -16117,577 +14494,49 @@
           </a:fontRef>
         </p:style>
       </p:pic>
-      <p:sp>
-        <p:nvSpPr>
-          <p:cNvPr id="9" name="Rectangle 8"/>
-          <p:cNvSpPr/>
-          <p:nvPr/>
-        </p:nvSpPr>
+      <p:pic>
+        <p:nvPicPr>
+          <p:cNvPr id="6" name="Content Placeholder 5"/>
+          <p:cNvPicPr>
+            <a:picLocks noGrp="1" noChangeAspect="1"/>
+          </p:cNvPicPr>
+          <p:nvPr>
+            <p:ph sz="quarter" idx="2"/>
+          </p:nvPr>
+        </p:nvPicPr>
+        <p:blipFill>
+          <a:blip r:embed="rId3">
+            <a:extLst>
+              <a:ext uri="{28A0092B-C50C-407E-A947-70E740481C1C}">
+                <a14:useLocalDpi xmlns:a14="http://schemas.microsoft.com/office/drawing/2010/main" val="0"/>
+              </a:ext>
+            </a:extLst>
+          </a:blip>
+          <a:stretch>
+            <a:fillRect/>
+          </a:stretch>
+        </p:blipFill>
         <p:spPr>
           <a:xfrm>
-            <a:off x="5865091" y="1255621"/>
-            <a:ext cx="2736777" cy="2894755"/>
+            <a:off x="4986610" y="1192175"/>
+            <a:ext cx="3602781" cy="3026702"/>
           </a:xfrm>
-          <a:prstGeom prst="rect">
-            <a:avLst/>
-          </a:prstGeom>
         </p:spPr>
         <p:style>
-          <a:lnRef idx="1">
-            <a:schemeClr val="accent1"/>
+          <a:lnRef idx="2">
+            <a:schemeClr val="dk1"/>
           </a:lnRef>
-          <a:fillRef idx="2">
-            <a:schemeClr val="accent1"/>
+          <a:fillRef idx="1">
+            <a:schemeClr val="lt1"/>
           </a:fillRef>
-          <a:effectRef idx="1">
-            <a:schemeClr val="accent1"/>
+          <a:effectRef idx="0">
+            <a:schemeClr val="dk1"/>
           </a:effectRef>
           <a:fontRef idx="minor">
             <a:schemeClr val="dk1"/>
           </a:fontRef>
         </p:style>
-        <p:txBody>
-          <a:bodyPr rtlCol="0" anchor="ctr"/>
-          <a:lstStyle/>
-          <a:p>
-            <a:pPr algn="ctr"/>
-            <a:r>
-              <a:rPr lang="en-US" dirty="0" smtClean="0"/>
-              <a:t>Record Food Intake</a:t>
-            </a:r>
-            <a:endParaRPr lang="en-US" dirty="0" smtClean="0"/>
-          </a:p>
-          <a:p>
-            <a:pPr algn="ctr"/>
-            <a:endParaRPr lang="en-US" dirty="0"/>
-          </a:p>
-          <a:p>
-            <a:pPr algn="ctr"/>
-            <a:endParaRPr lang="en-US" dirty="0" smtClean="0"/>
-          </a:p>
-          <a:p>
-            <a:pPr algn="ctr"/>
-            <a:endParaRPr lang="en-US" dirty="0"/>
-          </a:p>
-          <a:p>
-            <a:pPr algn="ctr"/>
-            <a:endParaRPr lang="en-US" dirty="0" smtClean="0"/>
-          </a:p>
-          <a:p>
-            <a:pPr algn="ctr"/>
-            <a:endParaRPr lang="en-US" dirty="0"/>
-          </a:p>
-          <a:p>
-            <a:pPr algn="ctr"/>
-            <a:endParaRPr lang="en-US" dirty="0" smtClean="0"/>
-          </a:p>
-          <a:p>
-            <a:pPr algn="ctr"/>
-            <a:endParaRPr lang="en-US" dirty="0"/>
-          </a:p>
-          <a:p>
-            <a:pPr algn="ctr"/>
-            <a:endParaRPr lang="en-US" sz="1200" dirty="0" smtClean="0"/>
-          </a:p>
-          <a:p>
-            <a:pPr algn="ctr"/>
-            <a:endParaRPr lang="en-US" sz="1200" dirty="0"/>
-          </a:p>
-          <a:p>
-            <a:pPr algn="ctr"/>
-            <a:endParaRPr lang="en-US" sz="1200" dirty="0"/>
-          </a:p>
-        </p:txBody>
-      </p:sp>
-      <p:sp>
-        <p:nvSpPr>
-          <p:cNvPr id="10" name="Oval 9"/>
-          <p:cNvSpPr/>
-          <p:nvPr/>
-        </p:nvSpPr>
-        <p:spPr>
-          <a:xfrm>
-            <a:off x="6051681" y="2138438"/>
-            <a:ext cx="1140612" cy="366991"/>
-          </a:xfrm>
-          <a:prstGeom prst="ellipse">
-            <a:avLst/>
-          </a:prstGeom>
-        </p:spPr>
-        <p:style>
-          <a:lnRef idx="1">
-            <a:schemeClr val="accent4"/>
-          </a:lnRef>
-          <a:fillRef idx="2">
-            <a:schemeClr val="accent4"/>
-          </a:fillRef>
-          <a:effectRef idx="1">
-            <a:schemeClr val="accent4"/>
-          </a:effectRef>
-          <a:fontRef idx="minor">
-            <a:schemeClr val="dk1"/>
-          </a:fontRef>
-        </p:style>
-        <p:txBody>
-          <a:bodyPr lIns="0" rIns="0" rtlCol="0" anchor="ctr"/>
-          <a:lstStyle/>
-          <a:p>
-            <a:pPr algn="ctr"/>
-            <a:r>
-              <a:rPr lang="en-US" sz="1000" dirty="0" smtClean="0"/>
-              <a:t>Record Food Intake</a:t>
-            </a:r>
-            <a:endParaRPr lang="en-US" sz="1000" dirty="0"/>
-          </a:p>
-        </p:txBody>
-      </p:sp>
-      <p:sp>
-        <p:nvSpPr>
-          <p:cNvPr id="11" name="Oval 10"/>
-          <p:cNvSpPr/>
-          <p:nvPr/>
-        </p:nvSpPr>
-        <p:spPr>
-          <a:xfrm>
-            <a:off x="7461256" y="1785723"/>
-            <a:ext cx="1140612" cy="320040"/>
-          </a:xfrm>
-          <a:prstGeom prst="ellipse">
-            <a:avLst/>
-          </a:prstGeom>
-        </p:spPr>
-        <p:style>
-          <a:lnRef idx="1">
-            <a:schemeClr val="accent4"/>
-          </a:lnRef>
-          <a:fillRef idx="2">
-            <a:schemeClr val="accent4"/>
-          </a:fillRef>
-          <a:effectRef idx="1">
-            <a:schemeClr val="accent4"/>
-          </a:effectRef>
-          <a:fontRef idx="minor">
-            <a:schemeClr val="dk1"/>
-          </a:fontRef>
-        </p:style>
-        <p:txBody>
-          <a:bodyPr lIns="0" rIns="0" rtlCol="0" anchor="ctr"/>
-          <a:lstStyle/>
-          <a:p>
-            <a:pPr algn="ctr"/>
-            <a:r>
-              <a:rPr lang="en-US" sz="1000" dirty="0" smtClean="0"/>
-              <a:t>Login</a:t>
-            </a:r>
-            <a:endParaRPr lang="en-US" sz="1000" dirty="0"/>
-          </a:p>
-        </p:txBody>
-      </p:sp>
-      <p:cxnSp>
-        <p:nvCxnSpPr>
-          <p:cNvPr id="13" name="Straight Connector 12"/>
-          <p:cNvCxnSpPr>
-            <a:endCxn id="10" idx="2"/>
-          </p:cNvCxnSpPr>
-          <p:nvPr/>
-        </p:nvCxnSpPr>
-        <p:spPr>
-          <a:xfrm>
-            <a:off x="5334005" y="2185308"/>
-            <a:ext cx="717676" cy="136626"/>
-          </a:xfrm>
-          <a:prstGeom prst="line">
-            <a:avLst/>
-          </a:prstGeom>
-        </p:spPr>
-        <p:style>
-          <a:lnRef idx="1">
-            <a:schemeClr val="dk1"/>
-          </a:lnRef>
-          <a:fillRef idx="0">
-            <a:schemeClr val="dk1"/>
-          </a:fillRef>
-          <a:effectRef idx="0">
-            <a:schemeClr val="dk1"/>
-          </a:effectRef>
-          <a:fontRef idx="minor">
-            <a:schemeClr val="tx1"/>
-          </a:fontRef>
-        </p:style>
-      </p:cxnSp>
-      <p:cxnSp>
-        <p:nvCxnSpPr>
-          <p:cNvPr id="14" name="Straight Connector 13"/>
-          <p:cNvCxnSpPr>
-            <a:stCxn id="11" idx="3"/>
-            <a:endCxn id="10" idx="7"/>
-          </p:cNvCxnSpPr>
-          <p:nvPr/>
-        </p:nvCxnSpPr>
-        <p:spPr>
-          <a:xfrm flipH="1">
-            <a:off x="7025254" y="2058894"/>
-            <a:ext cx="603041" cy="133289"/>
-          </a:xfrm>
-          <a:prstGeom prst="line">
-            <a:avLst/>
-          </a:prstGeom>
-          <a:ln w="12700">
-            <a:prstDash val="dash"/>
-            <a:tailEnd type="arrow" w="med" len="lg"/>
-          </a:ln>
-        </p:spPr>
-        <p:style>
-          <a:lnRef idx="2">
-            <a:schemeClr val="dk1"/>
-          </a:lnRef>
-          <a:fillRef idx="0">
-            <a:schemeClr val="dk1"/>
-          </a:fillRef>
-          <a:effectRef idx="1">
-            <a:schemeClr val="dk1"/>
-          </a:effectRef>
-          <a:fontRef idx="minor">
-            <a:schemeClr val="tx1"/>
-          </a:fontRef>
-        </p:style>
-      </p:cxnSp>
-      <p:grpSp>
-        <p:nvGrpSpPr>
-          <p:cNvPr id="34" name="Group 33"/>
-          <p:cNvGrpSpPr/>
-          <p:nvPr/>
-        </p:nvGrpSpPr>
-        <p:grpSpPr>
-          <a:xfrm>
-            <a:off x="4922669" y="1690632"/>
-            <a:ext cx="745742" cy="1000644"/>
-            <a:chOff x="4922669" y="1921532"/>
-            <a:chExt cx="745742" cy="1000644"/>
-          </a:xfrm>
-        </p:grpSpPr>
-        <p:pic>
-          <p:nvPicPr>
-            <p:cNvPr id="12" name="Picture 11" descr="UML_Actor.png"/>
-            <p:cNvPicPr>
-              <a:picLocks noChangeAspect="1"/>
-            </p:cNvPicPr>
-            <p:nvPr/>
-          </p:nvPicPr>
-          <p:blipFill>
-            <a:blip r:embed="rId3">
-              <a:extLst>
-                <a:ext uri="{28A0092B-C50C-407E-A947-70E740481C1C}">
-                  <a14:useLocalDpi xmlns:a14="http://schemas.microsoft.com/office/drawing/2010/main" val="0"/>
-                </a:ext>
-              </a:extLst>
-            </a:blip>
-            <a:stretch>
-              <a:fillRect/>
-            </a:stretch>
-          </p:blipFill>
-          <p:spPr>
-            <a:xfrm>
-              <a:off x="5042498" y="1921532"/>
-              <a:ext cx="506085" cy="826343"/>
-            </a:xfrm>
-            <a:prstGeom prst="rect">
-              <a:avLst/>
-            </a:prstGeom>
-          </p:spPr>
-        </p:pic>
-        <p:sp>
-          <p:nvSpPr>
-            <p:cNvPr id="16" name="TextBox 15"/>
-            <p:cNvSpPr txBox="1"/>
-            <p:nvPr/>
-          </p:nvSpPr>
-          <p:spPr>
-            <a:xfrm>
-              <a:off x="4922669" y="2645177"/>
-              <a:ext cx="745742" cy="276999"/>
-            </a:xfrm>
-            <a:prstGeom prst="rect">
-              <a:avLst/>
-            </a:prstGeom>
-            <a:noFill/>
-          </p:spPr>
-          <p:txBody>
-            <a:bodyPr wrap="none" rtlCol="0">
-              <a:spAutoFit/>
-            </a:bodyPr>
-            <a:lstStyle/>
-            <a:p>
-              <a:r>
-                <a:rPr lang="en-US" sz="1200" dirty="0" smtClean="0"/>
-                <a:t>Customer</a:t>
-              </a:r>
-              <a:endParaRPr lang="en-US" sz="1200" dirty="0"/>
-            </a:p>
-          </p:txBody>
-        </p:sp>
-      </p:grpSp>
-      <p:sp>
-        <p:nvSpPr>
-          <p:cNvPr id="17" name="TextBox 16"/>
-          <p:cNvSpPr txBox="1"/>
-          <p:nvPr/>
-        </p:nvSpPr>
-        <p:spPr>
-          <a:xfrm>
-            <a:off x="7192293" y="2074632"/>
-            <a:ext cx="740607" cy="215444"/>
-          </a:xfrm>
-          <a:prstGeom prst="rect">
-            <a:avLst/>
-          </a:prstGeom>
-          <a:noFill/>
-        </p:spPr>
-        <p:txBody>
-          <a:bodyPr wrap="none" rtlCol="0">
-            <a:spAutoFit/>
-          </a:bodyPr>
-          <a:lstStyle/>
-          <a:p>
-            <a:r>
-              <a:rPr lang="en-US" sz="800" dirty="0" smtClean="0"/>
-              <a:t>&lt;</a:t>
-            </a:r>
-            <a:r>
-              <a:rPr lang="en-US" sz="800" dirty="0" smtClean="0"/>
-              <a:t>&lt;include&gt;</a:t>
-            </a:r>
-            <a:r>
-              <a:rPr lang="en-US" sz="800" dirty="0" smtClean="0"/>
-              <a:t>&gt;</a:t>
-            </a:r>
-            <a:endParaRPr lang="en-US" sz="800" dirty="0"/>
-          </a:p>
-        </p:txBody>
-      </p:sp>
-      <p:cxnSp>
-        <p:nvCxnSpPr>
-          <p:cNvPr id="28" name="Straight Connector 27"/>
-          <p:cNvCxnSpPr>
-            <a:stCxn id="30" idx="0"/>
-            <a:endCxn id="10" idx="4"/>
-          </p:cNvCxnSpPr>
-          <p:nvPr/>
-        </p:nvCxnSpPr>
-        <p:spPr>
-          <a:xfrm flipH="1" flipV="1">
-            <a:off x="6621987" y="2505429"/>
-            <a:ext cx="1105332" cy="716917"/>
-          </a:xfrm>
-          <a:prstGeom prst="line">
-            <a:avLst/>
-          </a:prstGeom>
-          <a:ln w="12700">
-            <a:prstDash val="dash"/>
-            <a:tailEnd type="arrow" w="med" len="lg"/>
-          </a:ln>
-        </p:spPr>
-        <p:style>
-          <a:lnRef idx="2">
-            <a:schemeClr val="dk1"/>
-          </a:lnRef>
-          <a:fillRef idx="0">
-            <a:schemeClr val="dk1"/>
-          </a:fillRef>
-          <a:effectRef idx="1">
-            <a:schemeClr val="dk1"/>
-          </a:effectRef>
-          <a:fontRef idx="minor">
-            <a:schemeClr val="tx1"/>
-          </a:fontRef>
-        </p:style>
-      </p:cxnSp>
-      <p:sp>
-        <p:nvSpPr>
-          <p:cNvPr id="29" name="TextBox 28"/>
-          <p:cNvSpPr txBox="1"/>
-          <p:nvPr/>
-        </p:nvSpPr>
-        <p:spPr>
-          <a:xfrm>
-            <a:off x="6730023" y="2904679"/>
-            <a:ext cx="738554" cy="215444"/>
-          </a:xfrm>
-          <a:prstGeom prst="rect">
-            <a:avLst/>
-          </a:prstGeom>
-          <a:noFill/>
-        </p:spPr>
-        <p:txBody>
-          <a:bodyPr wrap="none" rtlCol="0">
-            <a:spAutoFit/>
-          </a:bodyPr>
-          <a:lstStyle/>
-          <a:p>
-            <a:r>
-              <a:rPr lang="en-US" sz="800" dirty="0" smtClean="0"/>
-              <a:t>&lt;&lt;extend&gt;&gt;</a:t>
-            </a:r>
-            <a:endParaRPr lang="en-US" sz="800" dirty="0"/>
-          </a:p>
-        </p:txBody>
-      </p:sp>
-      <p:sp>
-        <p:nvSpPr>
-          <p:cNvPr id="30" name="Oval 29"/>
-          <p:cNvSpPr/>
-          <p:nvPr/>
-        </p:nvSpPr>
-        <p:spPr>
-          <a:xfrm>
-            <a:off x="7157013" y="3222346"/>
-            <a:ext cx="1140612" cy="523239"/>
-          </a:xfrm>
-          <a:prstGeom prst="ellipse">
-            <a:avLst/>
-          </a:prstGeom>
-        </p:spPr>
-        <p:style>
-          <a:lnRef idx="1">
-            <a:schemeClr val="accent4"/>
-          </a:lnRef>
-          <a:fillRef idx="2">
-            <a:schemeClr val="accent4"/>
-          </a:fillRef>
-          <a:effectRef idx="1">
-            <a:schemeClr val="accent4"/>
-          </a:effectRef>
-          <a:fontRef idx="minor">
-            <a:schemeClr val="dk1"/>
-          </a:fontRef>
-        </p:style>
-        <p:txBody>
-          <a:bodyPr lIns="0" tIns="0" rIns="0" bIns="0" rtlCol="0" anchor="ctr"/>
-          <a:lstStyle/>
-          <a:p>
-            <a:pPr algn="ctr"/>
-            <a:r>
-              <a:rPr lang="en-US" sz="1000" dirty="0" smtClean="0"/>
-              <a:t>Personal Trainer Provides Meal Plan</a:t>
-            </a:r>
-            <a:endParaRPr lang="en-US" sz="1000" dirty="0"/>
-          </a:p>
-        </p:txBody>
-      </p:sp>
-      <p:grpSp>
-        <p:nvGrpSpPr>
-          <p:cNvPr id="36" name="Group 35"/>
-          <p:cNvGrpSpPr/>
-          <p:nvPr/>
-        </p:nvGrpSpPr>
-        <p:grpSpPr>
-          <a:xfrm>
-            <a:off x="5017347" y="2943940"/>
-            <a:ext cx="694797" cy="1300105"/>
-            <a:chOff x="5017347" y="3232565"/>
-            <a:chExt cx="694797" cy="1300105"/>
-          </a:xfrm>
-        </p:grpSpPr>
-        <p:pic>
-          <p:nvPicPr>
-            <p:cNvPr id="31" name="Picture 30" descr="UML_Actor.png"/>
-            <p:cNvPicPr>
-              <a:picLocks noChangeAspect="1"/>
-            </p:cNvPicPr>
-            <p:nvPr/>
-          </p:nvPicPr>
-          <p:blipFill>
-            <a:blip r:embed="rId3">
-              <a:extLst>
-                <a:ext uri="{28A0092B-C50C-407E-A947-70E740481C1C}">
-                  <a14:useLocalDpi xmlns:a14="http://schemas.microsoft.com/office/drawing/2010/main" val="0"/>
-                </a:ext>
-              </a:extLst>
-            </a:blip>
-            <a:stretch>
-              <a:fillRect/>
-            </a:stretch>
-          </p:blipFill>
-          <p:spPr>
-            <a:xfrm>
-              <a:off x="5137176" y="3232565"/>
-              <a:ext cx="506085" cy="826343"/>
-            </a:xfrm>
-            <a:prstGeom prst="rect">
-              <a:avLst/>
-            </a:prstGeom>
-          </p:spPr>
-        </p:pic>
-        <p:sp>
-          <p:nvSpPr>
-            <p:cNvPr id="32" name="TextBox 31"/>
-            <p:cNvSpPr txBox="1"/>
-            <p:nvPr/>
-          </p:nvSpPr>
-          <p:spPr>
-            <a:xfrm>
-              <a:off x="5017347" y="4071005"/>
-              <a:ext cx="694797" cy="461665"/>
-            </a:xfrm>
-            <a:prstGeom prst="rect">
-              <a:avLst/>
-            </a:prstGeom>
-            <a:noFill/>
-          </p:spPr>
-          <p:txBody>
-            <a:bodyPr wrap="none" rtlCol="0">
-              <a:spAutoFit/>
-            </a:bodyPr>
-            <a:lstStyle/>
-            <a:p>
-              <a:pPr algn="ctr"/>
-              <a:r>
-                <a:rPr lang="en-US" sz="1200" dirty="0" smtClean="0"/>
-                <a:t>Personal </a:t>
-              </a:r>
-            </a:p>
-            <a:p>
-              <a:r>
-                <a:rPr lang="en-US" sz="1200" dirty="0" smtClean="0"/>
-                <a:t>Trainer</a:t>
-              </a:r>
-              <a:endParaRPr lang="en-US" sz="1200" dirty="0"/>
-            </a:p>
-          </p:txBody>
-        </p:sp>
-      </p:grpSp>
-      <p:cxnSp>
-        <p:nvCxnSpPr>
-          <p:cNvPr id="33" name="Straight Connector 32"/>
-          <p:cNvCxnSpPr>
-            <a:endCxn id="30" idx="2"/>
-          </p:cNvCxnSpPr>
-          <p:nvPr/>
-        </p:nvCxnSpPr>
-        <p:spPr>
-          <a:xfrm>
-            <a:off x="5548583" y="3483966"/>
-            <a:ext cx="1608430" cy="0"/>
-          </a:xfrm>
-          <a:prstGeom prst="line">
-            <a:avLst/>
-          </a:prstGeom>
-        </p:spPr>
-        <p:style>
-          <a:lnRef idx="1">
-            <a:schemeClr val="dk1"/>
-          </a:lnRef>
-          <a:fillRef idx="0">
-            <a:schemeClr val="dk1"/>
-          </a:fillRef>
-          <a:effectRef idx="0">
-            <a:schemeClr val="dk1"/>
-          </a:effectRef>
-          <a:fontRef idx="minor">
-            <a:schemeClr val="tx1"/>
-          </a:fontRef>
-        </p:style>
-      </p:cxnSp>
+      </p:pic>
     </p:spTree>
     <p:extLst>
       <p:ext uri="{BB962C8B-B14F-4D97-AF65-F5344CB8AC3E}">
@@ -17058,7 +14907,7 @@
           <p:cNvPr id="5" name="Text Placeholder 4">
             <a:extLst>
               <a:ext uri="{FF2B5EF4-FFF2-40B4-BE49-F238E27FC236}">
-                <a16:creationId xmlns="" xmlns:a16="http://schemas.microsoft.com/office/drawing/2014/main" id="{4297ADF3-BC92-B548-B50D-6294C3AFCBC5}"/>
+                <a16:creationId xmlns:a16="http://schemas.microsoft.com/office/drawing/2014/main" xmlns="" id="{4297ADF3-BC92-B548-B50D-6294C3AFCBC5}"/>
               </a:ext>
             </a:extLst>
           </p:cNvPr>
@@ -17086,7 +14935,7 @@
           <p:cNvPr id="4" name="Title 3">
             <a:extLst>
               <a:ext uri="{FF2B5EF4-FFF2-40B4-BE49-F238E27FC236}">
-                <a16:creationId xmlns="" xmlns:a16="http://schemas.microsoft.com/office/drawing/2014/main" id="{5AC4E82C-61B5-3F4E-B395-7FB7D51AAAA4}"/>
+                <a16:creationId xmlns:a16="http://schemas.microsoft.com/office/drawing/2014/main" xmlns="" id="{5AC4E82C-61B5-3F4E-B395-7FB7D51AAAA4}"/>
               </a:ext>
             </a:extLst>
           </p:cNvPr>
@@ -17202,56 +15051,56 @@
                 <a:gridCol w="1170481">
                   <a:extLst>
                     <a:ext uri="{9D8B030D-6E8A-4147-A177-3AD203B41FA5}">
-                      <a16:colId xmlns="" xmlns:a16="http://schemas.microsoft.com/office/drawing/2014/main" val="20000"/>
+                      <a16:colId xmlns:a16="http://schemas.microsoft.com/office/drawing/2014/main" xmlns="" val="20000"/>
                     </a:ext>
                   </a:extLst>
                 </a:gridCol>
                 <a:gridCol w="585345">
                   <a:extLst>
                     <a:ext uri="{9D8B030D-6E8A-4147-A177-3AD203B41FA5}">
-                      <a16:colId xmlns="" xmlns:a16="http://schemas.microsoft.com/office/drawing/2014/main" val="20001"/>
+                      <a16:colId xmlns:a16="http://schemas.microsoft.com/office/drawing/2014/main" xmlns="" val="20001"/>
                     </a:ext>
                   </a:extLst>
                 </a:gridCol>
                 <a:gridCol w="1662574">
                   <a:extLst>
                     <a:ext uri="{9D8B030D-6E8A-4147-A177-3AD203B41FA5}">
-                      <a16:colId xmlns="" xmlns:a16="http://schemas.microsoft.com/office/drawing/2014/main" val="20002"/>
+                      <a16:colId xmlns:a16="http://schemas.microsoft.com/office/drawing/2014/main" xmlns="" val="20002"/>
                     </a:ext>
                   </a:extLst>
                 </a:gridCol>
                 <a:gridCol w="208280">
                   <a:extLst>
                     <a:ext uri="{9D8B030D-6E8A-4147-A177-3AD203B41FA5}">
-                      <a16:colId xmlns="" xmlns:a16="http://schemas.microsoft.com/office/drawing/2014/main" val="20003"/>
+                      <a16:colId xmlns:a16="http://schemas.microsoft.com/office/drawing/2014/main" xmlns="" val="20003"/>
                     </a:ext>
                   </a:extLst>
                 </a:gridCol>
                 <a:gridCol w="158691">
                   <a:extLst>
                     <a:ext uri="{9D8B030D-6E8A-4147-A177-3AD203B41FA5}">
-                      <a16:colId xmlns="" xmlns:a16="http://schemas.microsoft.com/office/drawing/2014/main" val="20004"/>
+                      <a16:colId xmlns:a16="http://schemas.microsoft.com/office/drawing/2014/main" xmlns="" val="20004"/>
                     </a:ext>
                   </a:extLst>
                 </a:gridCol>
                 <a:gridCol w="2311517">
                   <a:extLst>
                     <a:ext uri="{9D8B030D-6E8A-4147-A177-3AD203B41FA5}">
-                      <a16:colId xmlns="" xmlns:a16="http://schemas.microsoft.com/office/drawing/2014/main" val="20005"/>
+                      <a16:colId xmlns:a16="http://schemas.microsoft.com/office/drawing/2014/main" xmlns="" val="20005"/>
                     </a:ext>
                   </a:extLst>
                 </a:gridCol>
                 <a:gridCol w="876725">
                   <a:extLst>
                     <a:ext uri="{9D8B030D-6E8A-4147-A177-3AD203B41FA5}">
-                      <a16:colId xmlns="" xmlns:a16="http://schemas.microsoft.com/office/drawing/2014/main" val="20006"/>
+                      <a16:colId xmlns:a16="http://schemas.microsoft.com/office/drawing/2014/main" xmlns="" val="20006"/>
                     </a:ext>
                   </a:extLst>
                 </a:gridCol>
                 <a:gridCol w="1179793">
                   <a:extLst>
                     <a:ext uri="{9D8B030D-6E8A-4147-A177-3AD203B41FA5}">
-                      <a16:colId xmlns="" xmlns:a16="http://schemas.microsoft.com/office/drawing/2014/main" val="20007"/>
+                      <a16:colId xmlns:a16="http://schemas.microsoft.com/office/drawing/2014/main" xmlns="" val="20007"/>
                     </a:ext>
                   </a:extLst>
                 </a:gridCol>
@@ -17357,7 +15206,7 @@
                 </a:tc>
                 <a:extLst>
                   <a:ext uri="{0D108BD9-81ED-4DB2-BD59-A6C34878D82A}">
-                    <a16:rowId xmlns="" xmlns:a16="http://schemas.microsoft.com/office/drawing/2014/main" val="10000"/>
+                    <a16:rowId xmlns:a16="http://schemas.microsoft.com/office/drawing/2014/main" xmlns="" val="10000"/>
                   </a:ext>
                 </a:extLst>
               </a:tr>
@@ -17479,7 +15328,7 @@
                 </a:tc>
                 <a:extLst>
                   <a:ext uri="{0D108BD9-81ED-4DB2-BD59-A6C34878D82A}">
-                    <a16:rowId xmlns="" xmlns:a16="http://schemas.microsoft.com/office/drawing/2014/main" val="10001"/>
+                    <a16:rowId xmlns:a16="http://schemas.microsoft.com/office/drawing/2014/main" xmlns="" val="10001"/>
                   </a:ext>
                 </a:extLst>
               </a:tr>
@@ -17722,7 +15571,7 @@
                 </a:tc>
                 <a:extLst>
                   <a:ext uri="{0D108BD9-81ED-4DB2-BD59-A6C34878D82A}">
-                    <a16:rowId xmlns="" xmlns:a16="http://schemas.microsoft.com/office/drawing/2014/main" val="10002"/>
+                    <a16:rowId xmlns:a16="http://schemas.microsoft.com/office/drawing/2014/main" xmlns="" val="10002"/>
                   </a:ext>
                 </a:extLst>
               </a:tr>
@@ -17895,7 +15744,7 @@
                 </a:tc>
                 <a:extLst>
                   <a:ext uri="{0D108BD9-81ED-4DB2-BD59-A6C34878D82A}">
-                    <a16:rowId xmlns="" xmlns:a16="http://schemas.microsoft.com/office/drawing/2014/main" val="10003"/>
+                    <a16:rowId xmlns:a16="http://schemas.microsoft.com/office/drawing/2014/main" xmlns="" val="10003"/>
                   </a:ext>
                 </a:extLst>
               </a:tr>
@@ -18158,7 +16007,7 @@
                 </a:tc>
                 <a:extLst>
                   <a:ext uri="{0D108BD9-81ED-4DB2-BD59-A6C34878D82A}">
-                    <a16:rowId xmlns="" xmlns:a16="http://schemas.microsoft.com/office/drawing/2014/main" val="10004"/>
+                    <a16:rowId xmlns:a16="http://schemas.microsoft.com/office/drawing/2014/main" xmlns="" val="10004"/>
                   </a:ext>
                 </a:extLst>
               </a:tr>
@@ -18342,7 +16191,7 @@
                 </a:tc>
                 <a:extLst>
                   <a:ext uri="{0D108BD9-81ED-4DB2-BD59-A6C34878D82A}">
-                    <a16:rowId xmlns="" xmlns:a16="http://schemas.microsoft.com/office/drawing/2014/main" val="10005"/>
+                    <a16:rowId xmlns:a16="http://schemas.microsoft.com/office/drawing/2014/main" xmlns="" val="10005"/>
                   </a:ext>
                 </a:extLst>
               </a:tr>
@@ -18524,7 +16373,7 @@
                 </a:tc>
                 <a:extLst>
                   <a:ext uri="{0D108BD9-81ED-4DB2-BD59-A6C34878D82A}">
-                    <a16:rowId xmlns="" xmlns:a16="http://schemas.microsoft.com/office/drawing/2014/main" val="10006"/>
+                    <a16:rowId xmlns:a16="http://schemas.microsoft.com/office/drawing/2014/main" xmlns="" val="10006"/>
                   </a:ext>
                 </a:extLst>
               </a:tr>
@@ -18697,7 +16546,7 @@
                 </a:tc>
                 <a:extLst>
                   <a:ext uri="{0D108BD9-81ED-4DB2-BD59-A6C34878D82A}">
-                    <a16:rowId xmlns="" xmlns:a16="http://schemas.microsoft.com/office/drawing/2014/main" val="10007"/>
+                    <a16:rowId xmlns:a16="http://schemas.microsoft.com/office/drawing/2014/main" xmlns="" val="10007"/>
                   </a:ext>
                 </a:extLst>
               </a:tr>
@@ -18888,7 +16737,7 @@
                 </a:tc>
                 <a:extLst>
                   <a:ext uri="{0D108BD9-81ED-4DB2-BD59-A6C34878D82A}">
-                    <a16:rowId xmlns="" xmlns:a16="http://schemas.microsoft.com/office/drawing/2014/main" val="10008"/>
+                    <a16:rowId xmlns:a16="http://schemas.microsoft.com/office/drawing/2014/main" xmlns="" val="10008"/>
                   </a:ext>
                 </a:extLst>
               </a:tr>
@@ -19097,7 +16946,7 @@
                 </a:tc>
                 <a:extLst>
                   <a:ext uri="{0D108BD9-81ED-4DB2-BD59-A6C34878D82A}">
-                    <a16:rowId xmlns="" xmlns:a16="http://schemas.microsoft.com/office/drawing/2014/main" val="10009"/>
+                    <a16:rowId xmlns:a16="http://schemas.microsoft.com/office/drawing/2014/main" xmlns="" val="10009"/>
                   </a:ext>
                 </a:extLst>
               </a:tr>
@@ -19147,7 +16996,7 @@
           <p:cNvPr id="27" name="Table 26">
             <a:extLst>
               <a:ext uri="{FF2B5EF4-FFF2-40B4-BE49-F238E27FC236}">
-                <a16:creationId xmlns="" xmlns:a16="http://schemas.microsoft.com/office/drawing/2014/main" id="{D5C37F54-5F6F-F546-8424-9F6C71A2D1BD}"/>
+                <a16:creationId xmlns:a16="http://schemas.microsoft.com/office/drawing/2014/main" xmlns="" id="{D5C37F54-5F6F-F546-8424-9F6C71A2D1BD}"/>
               </a:ext>
             </a:extLst>
           </p:cNvPr>
@@ -19176,42 +17025,42 @@
                 <a:gridCol w="213756">
                   <a:extLst>
                     <a:ext uri="{9D8B030D-6E8A-4147-A177-3AD203B41FA5}">
-                      <a16:colId xmlns="" xmlns:a16="http://schemas.microsoft.com/office/drawing/2014/main" val="2688015389"/>
+                      <a16:colId xmlns:a16="http://schemas.microsoft.com/office/drawing/2014/main" xmlns="" val="2688015389"/>
                     </a:ext>
                   </a:extLst>
                 </a:gridCol>
                 <a:gridCol w="1549718">
                   <a:extLst>
                     <a:ext uri="{9D8B030D-6E8A-4147-A177-3AD203B41FA5}">
-                      <a16:colId xmlns="" xmlns:a16="http://schemas.microsoft.com/office/drawing/2014/main" val="1901220774"/>
+                      <a16:colId xmlns:a16="http://schemas.microsoft.com/office/drawing/2014/main" xmlns="" val="1901220774"/>
                     </a:ext>
                   </a:extLst>
                 </a:gridCol>
                 <a:gridCol w="1644744">
                   <a:extLst>
                     <a:ext uri="{9D8B030D-6E8A-4147-A177-3AD203B41FA5}">
-                      <a16:colId xmlns="" xmlns:a16="http://schemas.microsoft.com/office/drawing/2014/main" val="1973200309"/>
+                      <a16:colId xmlns:a16="http://schemas.microsoft.com/office/drawing/2014/main" xmlns="" val="1973200309"/>
                     </a:ext>
                   </a:extLst>
                 </a:gridCol>
                 <a:gridCol w="1688320">
                   <a:extLst>
                     <a:ext uri="{9D8B030D-6E8A-4147-A177-3AD203B41FA5}">
-                      <a16:colId xmlns="" xmlns:a16="http://schemas.microsoft.com/office/drawing/2014/main" val="2178221952"/>
+                      <a16:colId xmlns:a16="http://schemas.microsoft.com/office/drawing/2014/main" xmlns="" val="2178221952"/>
                     </a:ext>
                   </a:extLst>
                 </a:gridCol>
                 <a:gridCol w="1714490">
                   <a:extLst>
                     <a:ext uri="{9D8B030D-6E8A-4147-A177-3AD203B41FA5}">
-                      <a16:colId xmlns="" xmlns:a16="http://schemas.microsoft.com/office/drawing/2014/main" val="2438514074"/>
+                      <a16:colId xmlns:a16="http://schemas.microsoft.com/office/drawing/2014/main" xmlns="" val="2438514074"/>
                     </a:ext>
                   </a:extLst>
                 </a:gridCol>
                 <a:gridCol w="1816152">
                   <a:extLst>
                     <a:ext uri="{9D8B030D-6E8A-4147-A177-3AD203B41FA5}">
-                      <a16:colId xmlns="" xmlns:a16="http://schemas.microsoft.com/office/drawing/2014/main" val="882827926"/>
+                      <a16:colId xmlns:a16="http://schemas.microsoft.com/office/drawing/2014/main" xmlns="" val="882827926"/>
                     </a:ext>
                   </a:extLst>
                 </a:gridCol>
@@ -19618,7 +17467,7 @@
                 </a:tc>
                 <a:extLst>
                   <a:ext uri="{0D108BD9-81ED-4DB2-BD59-A6C34878D82A}">
-                    <a16:rowId xmlns="" xmlns:a16="http://schemas.microsoft.com/office/drawing/2014/main" val="3206989152"/>
+                    <a16:rowId xmlns:a16="http://schemas.microsoft.com/office/drawing/2014/main" xmlns="" val="3206989152"/>
                   </a:ext>
                 </a:extLst>
               </a:tr>
@@ -19983,7 +17832,7 @@
                 </a:tc>
                 <a:extLst>
                   <a:ext uri="{0D108BD9-81ED-4DB2-BD59-A6C34878D82A}">
-                    <a16:rowId xmlns="" xmlns:a16="http://schemas.microsoft.com/office/drawing/2014/main" val="651350196"/>
+                    <a16:rowId xmlns:a16="http://schemas.microsoft.com/office/drawing/2014/main" xmlns="" val="651350196"/>
                   </a:ext>
                 </a:extLst>
               </a:tr>
@@ -20396,7 +18245,7 @@
                 </a:tc>
                 <a:extLst>
                   <a:ext uri="{0D108BD9-81ED-4DB2-BD59-A6C34878D82A}">
-                    <a16:rowId xmlns="" xmlns:a16="http://schemas.microsoft.com/office/drawing/2014/main" val="2877274176"/>
+                    <a16:rowId xmlns:a16="http://schemas.microsoft.com/office/drawing/2014/main" xmlns="" val="2877274176"/>
                   </a:ext>
                 </a:extLst>
               </a:tr>
@@ -20786,7 +18635,7 @@
                 </a:tc>
                 <a:extLst>
                   <a:ext uri="{0D108BD9-81ED-4DB2-BD59-A6C34878D82A}">
-                    <a16:rowId xmlns="" xmlns:a16="http://schemas.microsoft.com/office/drawing/2014/main" val="3597776571"/>
+                    <a16:rowId xmlns:a16="http://schemas.microsoft.com/office/drawing/2014/main" xmlns="" val="3597776571"/>
                   </a:ext>
                 </a:extLst>
               </a:tr>
@@ -21152,7 +19001,7 @@
                 </a:tc>
                 <a:extLst>
                   <a:ext uri="{0D108BD9-81ED-4DB2-BD59-A6C34878D82A}">
-                    <a16:rowId xmlns="" xmlns:a16="http://schemas.microsoft.com/office/drawing/2014/main" val="2736150277"/>
+                    <a16:rowId xmlns:a16="http://schemas.microsoft.com/office/drawing/2014/main" xmlns="" val="2736150277"/>
                   </a:ext>
                 </a:extLst>
               </a:tr>
@@ -21189,7 +19038,7 @@
           <p:cNvPr id="7" name="Rectangle 6">
             <a:extLst>
               <a:ext uri="{FF2B5EF4-FFF2-40B4-BE49-F238E27FC236}">
-                <a16:creationId xmlns="" xmlns:a16="http://schemas.microsoft.com/office/drawing/2014/main" id="{9DFF5119-1E25-784D-8F87-4F769173656D}"/>
+                <a16:creationId xmlns:a16="http://schemas.microsoft.com/office/drawing/2014/main" xmlns="" id="{9DFF5119-1E25-784D-8F87-4F769173656D}"/>
               </a:ext>
             </a:extLst>
           </p:cNvPr>
@@ -21248,7 +19097,7 @@
           <p:cNvPr id="11" name="Rectangle 10">
             <a:extLst>
               <a:ext uri="{FF2B5EF4-FFF2-40B4-BE49-F238E27FC236}">
-                <a16:creationId xmlns="" xmlns:a16="http://schemas.microsoft.com/office/drawing/2014/main" id="{0325C231-FED2-EF4F-B083-25EABECDE3E3}"/>
+                <a16:creationId xmlns:a16="http://schemas.microsoft.com/office/drawing/2014/main" xmlns="" id="{0325C231-FED2-EF4F-B083-25EABECDE3E3}"/>
               </a:ext>
             </a:extLst>
           </p:cNvPr>
@@ -21307,7 +19156,7 @@
           <p:cNvPr id="15" name="Rectangle 14">
             <a:extLst>
               <a:ext uri="{FF2B5EF4-FFF2-40B4-BE49-F238E27FC236}">
-                <a16:creationId xmlns="" xmlns:a16="http://schemas.microsoft.com/office/drawing/2014/main" id="{F6C5CFCE-9F10-2047-B029-8F273A687CF5}"/>
+                <a16:creationId xmlns:a16="http://schemas.microsoft.com/office/drawing/2014/main" xmlns="" id="{F6C5CFCE-9F10-2047-B029-8F273A687CF5}"/>
               </a:ext>
             </a:extLst>
           </p:cNvPr>
@@ -21366,7 +19215,7 @@
           <p:cNvPr id="19" name="Rectangle 18">
             <a:extLst>
               <a:ext uri="{FF2B5EF4-FFF2-40B4-BE49-F238E27FC236}">
-                <a16:creationId xmlns="" xmlns:a16="http://schemas.microsoft.com/office/drawing/2014/main" id="{1740DF6C-07A4-8447-9A14-46557DA95325}"/>
+                <a16:creationId xmlns:a16="http://schemas.microsoft.com/office/drawing/2014/main" xmlns="" id="{1740DF6C-07A4-8447-9A14-46557DA95325}"/>
               </a:ext>
             </a:extLst>
           </p:cNvPr>
@@ -21425,7 +19274,7 @@
           <p:cNvPr id="23" name="Rectangle 22">
             <a:extLst>
               <a:ext uri="{FF2B5EF4-FFF2-40B4-BE49-F238E27FC236}">
-                <a16:creationId xmlns="" xmlns:a16="http://schemas.microsoft.com/office/drawing/2014/main" id="{B4D2527D-9AA0-3640-819B-462C19AB92C9}"/>
+                <a16:creationId xmlns:a16="http://schemas.microsoft.com/office/drawing/2014/main" xmlns="" id="{B4D2527D-9AA0-3640-819B-462C19AB92C9}"/>
               </a:ext>
             </a:extLst>
           </p:cNvPr>
@@ -21521,7 +19370,7 @@
           <p:cNvPr id="5" name="Text Placeholder 4">
             <a:extLst>
               <a:ext uri="{FF2B5EF4-FFF2-40B4-BE49-F238E27FC236}">
-                <a16:creationId xmlns="" xmlns:a16="http://schemas.microsoft.com/office/drawing/2014/main" id="{4297ADF3-BC92-B548-B50D-6294C3AFCBC5}"/>
+                <a16:creationId xmlns:a16="http://schemas.microsoft.com/office/drawing/2014/main" xmlns="" id="{4297ADF3-BC92-B548-B50D-6294C3AFCBC5}"/>
               </a:ext>
             </a:extLst>
           </p:cNvPr>
@@ -21549,7 +19398,7 @@
           <p:cNvPr id="4" name="Title 3">
             <a:extLst>
               <a:ext uri="{FF2B5EF4-FFF2-40B4-BE49-F238E27FC236}">
-                <a16:creationId xmlns="" xmlns:a16="http://schemas.microsoft.com/office/drawing/2014/main" id="{5AC4E82C-61B5-3F4E-B395-7FB7D51AAAA4}"/>
+                <a16:creationId xmlns:a16="http://schemas.microsoft.com/office/drawing/2014/main" xmlns="" id="{5AC4E82C-61B5-3F4E-B395-7FB7D51AAAA4}"/>
               </a:ext>
             </a:extLst>
           </p:cNvPr>
@@ -21665,21 +19514,21 @@
                 <a:gridCol w="734289">
                   <a:extLst>
                     <a:ext uri="{9D8B030D-6E8A-4147-A177-3AD203B41FA5}">
-                      <a16:colId xmlns="" xmlns:a16="http://schemas.microsoft.com/office/drawing/2014/main" val="20000"/>
+                      <a16:colId xmlns:a16="http://schemas.microsoft.com/office/drawing/2014/main" xmlns="" val="20000"/>
                     </a:ext>
                   </a:extLst>
                 </a:gridCol>
                 <a:gridCol w="6106691">
                   <a:extLst>
                     <a:ext uri="{9D8B030D-6E8A-4147-A177-3AD203B41FA5}">
-                      <a16:colId xmlns="" xmlns:a16="http://schemas.microsoft.com/office/drawing/2014/main" val="20001"/>
+                      <a16:colId xmlns:a16="http://schemas.microsoft.com/office/drawing/2014/main" xmlns="" val="20001"/>
                     </a:ext>
                   </a:extLst>
                 </a:gridCol>
                 <a:gridCol w="1312420">
                   <a:extLst>
                     <a:ext uri="{9D8B030D-6E8A-4147-A177-3AD203B41FA5}">
-                      <a16:colId xmlns="" xmlns:a16="http://schemas.microsoft.com/office/drawing/2014/main" val="20002"/>
+                      <a16:colId xmlns:a16="http://schemas.microsoft.com/office/drawing/2014/main" xmlns="" val="20002"/>
                     </a:ext>
                   </a:extLst>
                 </a:gridCol>
@@ -21766,7 +19615,7 @@
                 </a:tc>
                 <a:extLst>
                   <a:ext uri="{0D108BD9-81ED-4DB2-BD59-A6C34878D82A}">
-                    <a16:rowId xmlns="" xmlns:a16="http://schemas.microsoft.com/office/drawing/2014/main" val="10000"/>
+                    <a16:rowId xmlns:a16="http://schemas.microsoft.com/office/drawing/2014/main" xmlns="" val="10000"/>
                   </a:ext>
                 </a:extLst>
               </a:tr>
@@ -21872,7 +19721,7 @@
                 </a:tc>
                 <a:extLst>
                   <a:ext uri="{0D108BD9-81ED-4DB2-BD59-A6C34878D82A}">
-                    <a16:rowId xmlns="" xmlns:a16="http://schemas.microsoft.com/office/drawing/2014/main" val="10001"/>
+                    <a16:rowId xmlns:a16="http://schemas.microsoft.com/office/drawing/2014/main" xmlns="" val="10001"/>
                   </a:ext>
                 </a:extLst>
               </a:tr>
@@ -21978,7 +19827,7 @@
                 </a:tc>
                 <a:extLst>
                   <a:ext uri="{0D108BD9-81ED-4DB2-BD59-A6C34878D82A}">
-                    <a16:rowId xmlns="" xmlns:a16="http://schemas.microsoft.com/office/drawing/2014/main" val="10002"/>
+                    <a16:rowId xmlns:a16="http://schemas.microsoft.com/office/drawing/2014/main" xmlns="" val="10002"/>
                   </a:ext>
                 </a:extLst>
               </a:tr>
@@ -22084,7 +19933,7 @@
                 </a:tc>
                 <a:extLst>
                   <a:ext uri="{0D108BD9-81ED-4DB2-BD59-A6C34878D82A}">
-                    <a16:rowId xmlns="" xmlns:a16="http://schemas.microsoft.com/office/drawing/2014/main" val="10003"/>
+                    <a16:rowId xmlns:a16="http://schemas.microsoft.com/office/drawing/2014/main" xmlns="" val="10003"/>
                   </a:ext>
                 </a:extLst>
               </a:tr>
@@ -22190,7 +20039,7 @@
                 </a:tc>
                 <a:extLst>
                   <a:ext uri="{0D108BD9-81ED-4DB2-BD59-A6C34878D82A}">
-                    <a16:rowId xmlns="" xmlns:a16="http://schemas.microsoft.com/office/drawing/2014/main" val="10004"/>
+                    <a16:rowId xmlns:a16="http://schemas.microsoft.com/office/drawing/2014/main" xmlns="" val="10004"/>
                   </a:ext>
                 </a:extLst>
               </a:tr>
@@ -22296,7 +20145,7 @@
                 </a:tc>
                 <a:extLst>
                   <a:ext uri="{0D108BD9-81ED-4DB2-BD59-A6C34878D82A}">
-                    <a16:rowId xmlns="" xmlns:a16="http://schemas.microsoft.com/office/drawing/2014/main" val="10005"/>
+                    <a16:rowId xmlns:a16="http://schemas.microsoft.com/office/drawing/2014/main" xmlns="" val="10005"/>
                   </a:ext>
                 </a:extLst>
               </a:tr>
@@ -22402,7 +20251,7 @@
                 </a:tc>
                 <a:extLst>
                   <a:ext uri="{0D108BD9-81ED-4DB2-BD59-A6C34878D82A}">
-                    <a16:rowId xmlns="" xmlns:a16="http://schemas.microsoft.com/office/drawing/2014/main" val="10006"/>
+                    <a16:rowId xmlns:a16="http://schemas.microsoft.com/office/drawing/2014/main" xmlns="" val="10006"/>
                   </a:ext>
                 </a:extLst>
               </a:tr>
@@ -22508,7 +20357,7 @@
                 </a:tc>
                 <a:extLst>
                   <a:ext uri="{0D108BD9-81ED-4DB2-BD59-A6C34878D82A}">
-                    <a16:rowId xmlns="" xmlns:a16="http://schemas.microsoft.com/office/drawing/2014/main" val="10007"/>
+                    <a16:rowId xmlns:a16="http://schemas.microsoft.com/office/drawing/2014/main" xmlns="" val="10007"/>
                   </a:ext>
                 </a:extLst>
               </a:tr>
@@ -22614,7 +20463,7 @@
                 </a:tc>
                 <a:extLst>
                   <a:ext uri="{0D108BD9-81ED-4DB2-BD59-A6C34878D82A}">
-                    <a16:rowId xmlns="" xmlns:a16="http://schemas.microsoft.com/office/drawing/2014/main" val="10008"/>
+                    <a16:rowId xmlns:a16="http://schemas.microsoft.com/office/drawing/2014/main" xmlns="" val="10008"/>
                   </a:ext>
                 </a:extLst>
               </a:tr>
@@ -22688,7 +20537,7 @@
                 </a:tc>
                 <a:extLst>
                   <a:ext uri="{0D108BD9-81ED-4DB2-BD59-A6C34878D82A}">
-                    <a16:rowId xmlns="" xmlns:a16="http://schemas.microsoft.com/office/drawing/2014/main" val="10009"/>
+                    <a16:rowId xmlns:a16="http://schemas.microsoft.com/office/drawing/2014/main" xmlns="" val="10009"/>
                   </a:ext>
                 </a:extLst>
               </a:tr>
@@ -22786,21 +20635,21 @@
                 <a:gridCol w="734289">
                   <a:extLst>
                     <a:ext uri="{9D8B030D-6E8A-4147-A177-3AD203B41FA5}">
-                      <a16:colId xmlns="" xmlns:a16="http://schemas.microsoft.com/office/drawing/2014/main" val="20000"/>
+                      <a16:colId xmlns:a16="http://schemas.microsoft.com/office/drawing/2014/main" xmlns="" val="20000"/>
                     </a:ext>
                   </a:extLst>
                 </a:gridCol>
                 <a:gridCol w="6106691">
                   <a:extLst>
                     <a:ext uri="{9D8B030D-6E8A-4147-A177-3AD203B41FA5}">
-                      <a16:colId xmlns="" xmlns:a16="http://schemas.microsoft.com/office/drawing/2014/main" val="20001"/>
+                      <a16:colId xmlns:a16="http://schemas.microsoft.com/office/drawing/2014/main" xmlns="" val="20001"/>
                     </a:ext>
                   </a:extLst>
                 </a:gridCol>
                 <a:gridCol w="1312420">
                   <a:extLst>
                     <a:ext uri="{9D8B030D-6E8A-4147-A177-3AD203B41FA5}">
-                      <a16:colId xmlns="" xmlns:a16="http://schemas.microsoft.com/office/drawing/2014/main" val="20002"/>
+                      <a16:colId xmlns:a16="http://schemas.microsoft.com/office/drawing/2014/main" xmlns="" val="20002"/>
                     </a:ext>
                   </a:extLst>
                 </a:gridCol>
@@ -22889,7 +20738,7 @@
                 </a:tc>
                 <a:extLst>
                   <a:ext uri="{0D108BD9-81ED-4DB2-BD59-A6C34878D82A}">
-                    <a16:rowId xmlns="" xmlns:a16="http://schemas.microsoft.com/office/drawing/2014/main" val="10000"/>
+                    <a16:rowId xmlns:a16="http://schemas.microsoft.com/office/drawing/2014/main" xmlns="" val="10000"/>
                   </a:ext>
                 </a:extLst>
               </a:tr>
@@ -22995,7 +20844,7 @@
                 </a:tc>
                 <a:extLst>
                   <a:ext uri="{0D108BD9-81ED-4DB2-BD59-A6C34878D82A}">
-                    <a16:rowId xmlns="" xmlns:a16="http://schemas.microsoft.com/office/drawing/2014/main" val="10001"/>
+                    <a16:rowId xmlns:a16="http://schemas.microsoft.com/office/drawing/2014/main" xmlns="" val="10001"/>
                   </a:ext>
                 </a:extLst>
               </a:tr>
@@ -23101,7 +20950,7 @@
                 </a:tc>
                 <a:extLst>
                   <a:ext uri="{0D108BD9-81ED-4DB2-BD59-A6C34878D82A}">
-                    <a16:rowId xmlns="" xmlns:a16="http://schemas.microsoft.com/office/drawing/2014/main" val="10002"/>
+                    <a16:rowId xmlns:a16="http://schemas.microsoft.com/office/drawing/2014/main" xmlns="" val="10002"/>
                   </a:ext>
                 </a:extLst>
               </a:tr>
@@ -23207,7 +21056,7 @@
                 </a:tc>
                 <a:extLst>
                   <a:ext uri="{0D108BD9-81ED-4DB2-BD59-A6C34878D82A}">
-                    <a16:rowId xmlns="" xmlns:a16="http://schemas.microsoft.com/office/drawing/2014/main" val="10003"/>
+                    <a16:rowId xmlns:a16="http://schemas.microsoft.com/office/drawing/2014/main" xmlns="" val="10003"/>
                   </a:ext>
                 </a:extLst>
               </a:tr>
@@ -23313,7 +21162,7 @@
                 </a:tc>
                 <a:extLst>
                   <a:ext uri="{0D108BD9-81ED-4DB2-BD59-A6C34878D82A}">
-                    <a16:rowId xmlns="" xmlns:a16="http://schemas.microsoft.com/office/drawing/2014/main" val="10004"/>
+                    <a16:rowId xmlns:a16="http://schemas.microsoft.com/office/drawing/2014/main" xmlns="" val="10004"/>
                   </a:ext>
                 </a:extLst>
               </a:tr>
@@ -23419,7 +21268,7 @@
                 </a:tc>
                 <a:extLst>
                   <a:ext uri="{0D108BD9-81ED-4DB2-BD59-A6C34878D82A}">
-                    <a16:rowId xmlns="" xmlns:a16="http://schemas.microsoft.com/office/drawing/2014/main" val="10005"/>
+                    <a16:rowId xmlns:a16="http://schemas.microsoft.com/office/drawing/2014/main" xmlns="" val="10005"/>
                   </a:ext>
                 </a:extLst>
               </a:tr>
@@ -23545,7 +21394,7 @@
                 </a:tc>
                 <a:extLst>
                   <a:ext uri="{0D108BD9-81ED-4DB2-BD59-A6C34878D82A}">
-                    <a16:rowId xmlns="" xmlns:a16="http://schemas.microsoft.com/office/drawing/2014/main" val="10006"/>
+                    <a16:rowId xmlns:a16="http://schemas.microsoft.com/office/drawing/2014/main" xmlns="" val="10006"/>
                   </a:ext>
                 </a:extLst>
               </a:tr>
@@ -23651,7 +21500,7 @@
                 </a:tc>
                 <a:extLst>
                   <a:ext uri="{0D108BD9-81ED-4DB2-BD59-A6C34878D82A}">
-                    <a16:rowId xmlns="" xmlns:a16="http://schemas.microsoft.com/office/drawing/2014/main" val="10007"/>
+                    <a16:rowId xmlns:a16="http://schemas.microsoft.com/office/drawing/2014/main" xmlns="" val="10007"/>
                   </a:ext>
                 </a:extLst>
               </a:tr>
@@ -23757,7 +21606,7 @@
                 </a:tc>
                 <a:extLst>
                   <a:ext uri="{0D108BD9-81ED-4DB2-BD59-A6C34878D82A}">
-                    <a16:rowId xmlns="" xmlns:a16="http://schemas.microsoft.com/office/drawing/2014/main" val="10008"/>
+                    <a16:rowId xmlns:a16="http://schemas.microsoft.com/office/drawing/2014/main" xmlns="" val="10008"/>
                   </a:ext>
                 </a:extLst>
               </a:tr>
@@ -23863,7 +21712,7 @@
                 </a:tc>
                 <a:extLst>
                   <a:ext uri="{0D108BD9-81ED-4DB2-BD59-A6C34878D82A}">
-                    <a16:rowId xmlns="" xmlns:a16="http://schemas.microsoft.com/office/drawing/2014/main" val="10009"/>
+                    <a16:rowId xmlns:a16="http://schemas.microsoft.com/office/drawing/2014/main" xmlns="" val="10009"/>
                   </a:ext>
                 </a:extLst>
               </a:tr>
@@ -23961,21 +21810,21 @@
                 <a:gridCol w="734289">
                   <a:extLst>
                     <a:ext uri="{9D8B030D-6E8A-4147-A177-3AD203B41FA5}">
-                      <a16:colId xmlns="" xmlns:a16="http://schemas.microsoft.com/office/drawing/2014/main" val="20000"/>
+                      <a16:colId xmlns:a16="http://schemas.microsoft.com/office/drawing/2014/main" xmlns="" val="20000"/>
                     </a:ext>
                   </a:extLst>
                 </a:gridCol>
                 <a:gridCol w="6106691">
                   <a:extLst>
                     <a:ext uri="{9D8B030D-6E8A-4147-A177-3AD203B41FA5}">
-                      <a16:colId xmlns="" xmlns:a16="http://schemas.microsoft.com/office/drawing/2014/main" val="20001"/>
+                      <a16:colId xmlns:a16="http://schemas.microsoft.com/office/drawing/2014/main" xmlns="" val="20001"/>
                     </a:ext>
                   </a:extLst>
                 </a:gridCol>
                 <a:gridCol w="1312420">
                   <a:extLst>
                     <a:ext uri="{9D8B030D-6E8A-4147-A177-3AD203B41FA5}">
-                      <a16:colId xmlns="" xmlns:a16="http://schemas.microsoft.com/office/drawing/2014/main" val="20002"/>
+                      <a16:colId xmlns:a16="http://schemas.microsoft.com/office/drawing/2014/main" xmlns="" val="20002"/>
                     </a:ext>
                   </a:extLst>
                 </a:gridCol>
@@ -24062,7 +21911,7 @@
                 </a:tc>
                 <a:extLst>
                   <a:ext uri="{0D108BD9-81ED-4DB2-BD59-A6C34878D82A}">
-                    <a16:rowId xmlns="" xmlns:a16="http://schemas.microsoft.com/office/drawing/2014/main" val="10000"/>
+                    <a16:rowId xmlns:a16="http://schemas.microsoft.com/office/drawing/2014/main" xmlns="" val="10000"/>
                   </a:ext>
                 </a:extLst>
               </a:tr>
@@ -24168,7 +22017,7 @@
                 </a:tc>
                 <a:extLst>
                   <a:ext uri="{0D108BD9-81ED-4DB2-BD59-A6C34878D82A}">
-                    <a16:rowId xmlns="" xmlns:a16="http://schemas.microsoft.com/office/drawing/2014/main" val="10001"/>
+                    <a16:rowId xmlns:a16="http://schemas.microsoft.com/office/drawing/2014/main" xmlns="" val="10001"/>
                   </a:ext>
                 </a:extLst>
               </a:tr>
@@ -24274,7 +22123,7 @@
                 </a:tc>
                 <a:extLst>
                   <a:ext uri="{0D108BD9-81ED-4DB2-BD59-A6C34878D82A}">
-                    <a16:rowId xmlns="" xmlns:a16="http://schemas.microsoft.com/office/drawing/2014/main" val="10002"/>
+                    <a16:rowId xmlns:a16="http://schemas.microsoft.com/office/drawing/2014/main" xmlns="" val="10002"/>
                   </a:ext>
                 </a:extLst>
               </a:tr>
@@ -24380,7 +22229,7 @@
                 </a:tc>
                 <a:extLst>
                   <a:ext uri="{0D108BD9-81ED-4DB2-BD59-A6C34878D82A}">
-                    <a16:rowId xmlns="" xmlns:a16="http://schemas.microsoft.com/office/drawing/2014/main" val="10003"/>
+                    <a16:rowId xmlns:a16="http://schemas.microsoft.com/office/drawing/2014/main" xmlns="" val="10003"/>
                   </a:ext>
                 </a:extLst>
               </a:tr>
@@ -24486,7 +22335,7 @@
                 </a:tc>
                 <a:extLst>
                   <a:ext uri="{0D108BD9-81ED-4DB2-BD59-A6C34878D82A}">
-                    <a16:rowId xmlns="" xmlns:a16="http://schemas.microsoft.com/office/drawing/2014/main" val="10004"/>
+                    <a16:rowId xmlns:a16="http://schemas.microsoft.com/office/drawing/2014/main" xmlns="" val="10004"/>
                   </a:ext>
                 </a:extLst>
               </a:tr>
@@ -24592,7 +22441,7 @@
                 </a:tc>
                 <a:extLst>
                   <a:ext uri="{0D108BD9-81ED-4DB2-BD59-A6C34878D82A}">
-                    <a16:rowId xmlns="" xmlns:a16="http://schemas.microsoft.com/office/drawing/2014/main" val="10005"/>
+                    <a16:rowId xmlns:a16="http://schemas.microsoft.com/office/drawing/2014/main" xmlns="" val="10005"/>
                   </a:ext>
                 </a:extLst>
               </a:tr>
@@ -24698,7 +22547,7 @@
                 </a:tc>
                 <a:extLst>
                   <a:ext uri="{0D108BD9-81ED-4DB2-BD59-A6C34878D82A}">
-                    <a16:rowId xmlns="" xmlns:a16="http://schemas.microsoft.com/office/drawing/2014/main" val="10006"/>
+                    <a16:rowId xmlns:a16="http://schemas.microsoft.com/office/drawing/2014/main" xmlns="" val="10006"/>
                   </a:ext>
                 </a:extLst>
               </a:tr>
@@ -24804,7 +22653,7 @@
                 </a:tc>
                 <a:extLst>
                   <a:ext uri="{0D108BD9-81ED-4DB2-BD59-A6C34878D82A}">
-                    <a16:rowId xmlns="" xmlns:a16="http://schemas.microsoft.com/office/drawing/2014/main" val="10007"/>
+                    <a16:rowId xmlns:a16="http://schemas.microsoft.com/office/drawing/2014/main" xmlns="" val="10007"/>
                   </a:ext>
                 </a:extLst>
               </a:tr>
@@ -24910,7 +22759,7 @@
                 </a:tc>
                 <a:extLst>
                   <a:ext uri="{0D108BD9-81ED-4DB2-BD59-A6C34878D82A}">
-                    <a16:rowId xmlns="" xmlns:a16="http://schemas.microsoft.com/office/drawing/2014/main" val="10008"/>
+                    <a16:rowId xmlns:a16="http://schemas.microsoft.com/office/drawing/2014/main" xmlns="" val="10008"/>
                   </a:ext>
                 </a:extLst>
               </a:tr>
@@ -25016,7 +22865,7 @@
                 </a:tc>
                 <a:extLst>
                   <a:ext uri="{0D108BD9-81ED-4DB2-BD59-A6C34878D82A}">
-                    <a16:rowId xmlns="" xmlns:a16="http://schemas.microsoft.com/office/drawing/2014/main" val="10009"/>
+                    <a16:rowId xmlns:a16="http://schemas.microsoft.com/office/drawing/2014/main" xmlns="" val="10009"/>
                   </a:ext>
                 </a:extLst>
               </a:tr>
@@ -25114,21 +22963,21 @@
                 <a:gridCol w="682982">
                   <a:extLst>
                     <a:ext uri="{9D8B030D-6E8A-4147-A177-3AD203B41FA5}">
-                      <a16:colId xmlns="" xmlns:a16="http://schemas.microsoft.com/office/drawing/2014/main" val="20000"/>
+                      <a16:colId xmlns:a16="http://schemas.microsoft.com/office/drawing/2014/main" xmlns="" val="20000"/>
                     </a:ext>
                   </a:extLst>
                 </a:gridCol>
                 <a:gridCol w="6825230">
                   <a:extLst>
                     <a:ext uri="{9D8B030D-6E8A-4147-A177-3AD203B41FA5}">
-                      <a16:colId xmlns="" xmlns:a16="http://schemas.microsoft.com/office/drawing/2014/main" val="20001"/>
+                      <a16:colId xmlns:a16="http://schemas.microsoft.com/office/drawing/2014/main" xmlns="" val="20001"/>
                     </a:ext>
                   </a:extLst>
                 </a:gridCol>
                 <a:gridCol w="910885">
                   <a:extLst>
                     <a:ext uri="{9D8B030D-6E8A-4147-A177-3AD203B41FA5}">
-                      <a16:colId xmlns="" xmlns:a16="http://schemas.microsoft.com/office/drawing/2014/main" val="20002"/>
+                      <a16:colId xmlns:a16="http://schemas.microsoft.com/office/drawing/2014/main" xmlns="" val="20002"/>
                     </a:ext>
                   </a:extLst>
                 </a:gridCol>
@@ -25216,7 +23065,7 @@
                 </a:tc>
                 <a:extLst>
                   <a:ext uri="{0D108BD9-81ED-4DB2-BD59-A6C34878D82A}">
-                    <a16:rowId xmlns="" xmlns:a16="http://schemas.microsoft.com/office/drawing/2014/main" val="10000"/>
+                    <a16:rowId xmlns:a16="http://schemas.microsoft.com/office/drawing/2014/main" xmlns="" val="10000"/>
                   </a:ext>
                 </a:extLst>
               </a:tr>
@@ -25322,7 +23171,7 @@
                 </a:tc>
                 <a:extLst>
                   <a:ext uri="{0D108BD9-81ED-4DB2-BD59-A6C34878D82A}">
-                    <a16:rowId xmlns="" xmlns:a16="http://schemas.microsoft.com/office/drawing/2014/main" val="10001"/>
+                    <a16:rowId xmlns:a16="http://schemas.microsoft.com/office/drawing/2014/main" xmlns="" val="10001"/>
                   </a:ext>
                 </a:extLst>
               </a:tr>
@@ -25428,7 +23277,7 @@
                 </a:tc>
                 <a:extLst>
                   <a:ext uri="{0D108BD9-81ED-4DB2-BD59-A6C34878D82A}">
-                    <a16:rowId xmlns="" xmlns:a16="http://schemas.microsoft.com/office/drawing/2014/main" val="10002"/>
+                    <a16:rowId xmlns:a16="http://schemas.microsoft.com/office/drawing/2014/main" xmlns="" val="10002"/>
                   </a:ext>
                 </a:extLst>
               </a:tr>
@@ -25534,7 +23383,7 @@
                 </a:tc>
                 <a:extLst>
                   <a:ext uri="{0D108BD9-81ED-4DB2-BD59-A6C34878D82A}">
-                    <a16:rowId xmlns="" xmlns:a16="http://schemas.microsoft.com/office/drawing/2014/main" val="10003"/>
+                    <a16:rowId xmlns:a16="http://schemas.microsoft.com/office/drawing/2014/main" xmlns="" val="10003"/>
                   </a:ext>
                 </a:extLst>
               </a:tr>
@@ -25640,7 +23489,7 @@
                 </a:tc>
                 <a:extLst>
                   <a:ext uri="{0D108BD9-81ED-4DB2-BD59-A6C34878D82A}">
-                    <a16:rowId xmlns="" xmlns:a16="http://schemas.microsoft.com/office/drawing/2014/main" val="10004"/>
+                    <a16:rowId xmlns:a16="http://schemas.microsoft.com/office/drawing/2014/main" xmlns="" val="10004"/>
                   </a:ext>
                 </a:extLst>
               </a:tr>
@@ -25746,7 +23595,7 @@
                 </a:tc>
                 <a:extLst>
                   <a:ext uri="{0D108BD9-81ED-4DB2-BD59-A6C34878D82A}">
-                    <a16:rowId xmlns="" xmlns:a16="http://schemas.microsoft.com/office/drawing/2014/main" val="10005"/>
+                    <a16:rowId xmlns:a16="http://schemas.microsoft.com/office/drawing/2014/main" xmlns="" val="10005"/>
                   </a:ext>
                 </a:extLst>
               </a:tr>
@@ -25852,7 +23701,7 @@
                 </a:tc>
                 <a:extLst>
                   <a:ext uri="{0D108BD9-81ED-4DB2-BD59-A6C34878D82A}">
-                    <a16:rowId xmlns="" xmlns:a16="http://schemas.microsoft.com/office/drawing/2014/main" val="10006"/>
+                    <a16:rowId xmlns:a16="http://schemas.microsoft.com/office/drawing/2014/main" xmlns="" val="10006"/>
                   </a:ext>
                 </a:extLst>
               </a:tr>
@@ -25958,7 +23807,7 @@
                 </a:tc>
                 <a:extLst>
                   <a:ext uri="{0D108BD9-81ED-4DB2-BD59-A6C34878D82A}">
-                    <a16:rowId xmlns="" xmlns:a16="http://schemas.microsoft.com/office/drawing/2014/main" val="10007"/>
+                    <a16:rowId xmlns:a16="http://schemas.microsoft.com/office/drawing/2014/main" xmlns="" val="10007"/>
                   </a:ext>
                 </a:extLst>
               </a:tr>
@@ -26064,7 +23913,7 @@
                 </a:tc>
                 <a:extLst>
                   <a:ext uri="{0D108BD9-81ED-4DB2-BD59-A6C34878D82A}">
-                    <a16:rowId xmlns="" xmlns:a16="http://schemas.microsoft.com/office/drawing/2014/main" val="10008"/>
+                    <a16:rowId xmlns:a16="http://schemas.microsoft.com/office/drawing/2014/main" xmlns="" val="10008"/>
                   </a:ext>
                 </a:extLst>
               </a:tr>
@@ -26170,7 +24019,7 @@
                 </a:tc>
                 <a:extLst>
                   <a:ext uri="{0D108BD9-81ED-4DB2-BD59-A6C34878D82A}">
-                    <a16:rowId xmlns="" xmlns:a16="http://schemas.microsoft.com/office/drawing/2014/main" val="10009"/>
+                    <a16:rowId xmlns:a16="http://schemas.microsoft.com/office/drawing/2014/main" xmlns="" val="10009"/>
                   </a:ext>
                 </a:extLst>
               </a:tr>
@@ -26762,7 +24611,7 @@
   <a:extraClrSchemeLst/>
   <a:extLst>
     <a:ext uri="{05A4C25C-085E-4340-85A3-A5531E510DB2}">
-      <thm15:themeFamily xmlns="" xmlns:thm15="http://schemas.microsoft.com/office/thememl/2012/main" name="Office Theme" id="{62F939B6-93AF-4DB8-9C6B-D6C7DFDC589F}" vid="{4A3C46E8-61CC-4603-A589-7422A47A8E4A}"/>
+      <thm15:themeFamily xmlns:thm15="http://schemas.microsoft.com/office/thememl/2012/main" xmlns="" name="Office Theme" id="{62F939B6-93AF-4DB8-9C6B-D6C7DFDC589F}" vid="{4A3C46E8-61CC-4603-A589-7422A47A8E4A}"/>
     </a:ext>
   </a:extLst>
 </a:theme>

</xml_diff>